<commit_message>
test maxdiff - dodane slike i screenings
</commit_message>
<xml_diff>
--- a/test/prezentacija/prezentacija_maxdiff_en.pptx
+++ b/test/prezentacija/prezentacija_maxdiff_en.pptx
@@ -7,25 +7,28 @@
   <p:sldIdLst>
     <p:sldId id="256" r:id="rId2"/>
     <p:sldId id="405" r:id="rId3"/>
-    <p:sldId id="391" r:id="rId4"/>
-    <p:sldId id="392" r:id="rId5"/>
+    <p:sldId id="413" r:id="rId4"/>
+    <p:sldId id="414" r:id="rId5"/>
     <p:sldId id="406" r:id="rId6"/>
     <p:sldId id="395" r:id="rId7"/>
     <p:sldId id="393" r:id="rId8"/>
     <p:sldId id="412" r:id="rId9"/>
-    <p:sldId id="407" r:id="rId10"/>
-    <p:sldId id="411" r:id="rId11"/>
-    <p:sldId id="403" r:id="rId12"/>
-    <p:sldId id="397" r:id="rId13"/>
-    <p:sldId id="398" r:id="rId14"/>
-    <p:sldId id="399" r:id="rId15"/>
-    <p:sldId id="400" r:id="rId16"/>
-    <p:sldId id="401" r:id="rId17"/>
-    <p:sldId id="410" r:id="rId18"/>
-    <p:sldId id="402" r:id="rId19"/>
-    <p:sldId id="408" r:id="rId20"/>
-    <p:sldId id="409" r:id="rId21"/>
-    <p:sldId id="271" r:id="rId22"/>
+    <p:sldId id="417" r:id="rId10"/>
+    <p:sldId id="415" r:id="rId11"/>
+    <p:sldId id="407" r:id="rId12"/>
+    <p:sldId id="411" r:id="rId13"/>
+    <p:sldId id="403" r:id="rId14"/>
+    <p:sldId id="397" r:id="rId15"/>
+    <p:sldId id="398" r:id="rId16"/>
+    <p:sldId id="399" r:id="rId17"/>
+    <p:sldId id="400" r:id="rId18"/>
+    <p:sldId id="401" r:id="rId19"/>
+    <p:sldId id="410" r:id="rId20"/>
+    <p:sldId id="402" r:id="rId21"/>
+    <p:sldId id="408" r:id="rId22"/>
+    <p:sldId id="409" r:id="rId23"/>
+    <p:sldId id="416" r:id="rId24"/>
+    <p:sldId id="271" r:id="rId25"/>
   </p:sldIdLst>
   <p:sldSz cx="9144000" cy="6858000" type="screen4x3"/>
   <p:notesSz cx="7104063" cy="10234613"/>
@@ -325,7 +328,7 @@
             <a:fld id="{52713974-83E4-49FC-AB57-17EEA02D934E}" type="datetimeFigureOut">
               <a:rPr lang="sr-Latn-CS" smtClean="0"/>
               <a:pPr/>
-              <a:t>21.1.2020.</a:t>
+              <a:t>14.3.2020.</a:t>
             </a:fld>
             <a:endParaRPr lang="hr-HR"/>
           </a:p>
@@ -492,7 +495,7 @@
             <a:fld id="{52713974-83E4-49FC-AB57-17EEA02D934E}" type="datetimeFigureOut">
               <a:rPr lang="sr-Latn-CS" smtClean="0"/>
               <a:pPr/>
-              <a:t>21.1.2020.</a:t>
+              <a:t>14.3.2020.</a:t>
             </a:fld>
             <a:endParaRPr lang="hr-HR"/>
           </a:p>
@@ -669,7 +672,7 @@
             <a:fld id="{52713974-83E4-49FC-AB57-17EEA02D934E}" type="datetimeFigureOut">
               <a:rPr lang="sr-Latn-CS" smtClean="0"/>
               <a:pPr/>
-              <a:t>21.1.2020.</a:t>
+              <a:t>14.3.2020.</a:t>
             </a:fld>
             <a:endParaRPr lang="hr-HR"/>
           </a:p>
@@ -836,7 +839,7 @@
             <a:fld id="{52713974-83E4-49FC-AB57-17EEA02D934E}" type="datetimeFigureOut">
               <a:rPr lang="sr-Latn-CS" smtClean="0"/>
               <a:pPr/>
-              <a:t>21.1.2020.</a:t>
+              <a:t>14.3.2020.</a:t>
             </a:fld>
             <a:endParaRPr lang="hr-HR" dirty="0"/>
           </a:p>
@@ -1079,7 +1082,7 @@
             <a:fld id="{52713974-83E4-49FC-AB57-17EEA02D934E}" type="datetimeFigureOut">
               <a:rPr lang="sr-Latn-CS" smtClean="0"/>
               <a:pPr/>
-              <a:t>21.1.2020.</a:t>
+              <a:t>14.3.2020.</a:t>
             </a:fld>
             <a:endParaRPr lang="hr-HR"/>
           </a:p>
@@ -1364,7 +1367,7 @@
             <a:fld id="{52713974-83E4-49FC-AB57-17EEA02D934E}" type="datetimeFigureOut">
               <a:rPr lang="sr-Latn-CS" smtClean="0"/>
               <a:pPr/>
-              <a:t>21.1.2020.</a:t>
+              <a:t>14.3.2020.</a:t>
             </a:fld>
             <a:endParaRPr lang="hr-HR"/>
           </a:p>
@@ -1783,7 +1786,7 @@
             <a:fld id="{52713974-83E4-49FC-AB57-17EEA02D934E}" type="datetimeFigureOut">
               <a:rPr lang="sr-Latn-CS" smtClean="0"/>
               <a:pPr/>
-              <a:t>21.1.2020.</a:t>
+              <a:t>14.3.2020.</a:t>
             </a:fld>
             <a:endParaRPr lang="hr-HR"/>
           </a:p>
@@ -1898,7 +1901,7 @@
             <a:fld id="{52713974-83E4-49FC-AB57-17EEA02D934E}" type="datetimeFigureOut">
               <a:rPr lang="sr-Latn-CS" smtClean="0"/>
               <a:pPr/>
-              <a:t>21.1.2020.</a:t>
+              <a:t>14.3.2020.</a:t>
             </a:fld>
             <a:endParaRPr lang="hr-HR"/>
           </a:p>
@@ -1990,7 +1993,7 @@
             <a:fld id="{52713974-83E4-49FC-AB57-17EEA02D934E}" type="datetimeFigureOut">
               <a:rPr lang="sr-Latn-CS" smtClean="0"/>
               <a:pPr/>
-              <a:t>21.1.2020.</a:t>
+              <a:t>14.3.2020.</a:t>
             </a:fld>
             <a:endParaRPr lang="hr-HR"/>
           </a:p>
@@ -2264,7 +2267,7 @@
             <a:fld id="{52713974-83E4-49FC-AB57-17EEA02D934E}" type="datetimeFigureOut">
               <a:rPr lang="sr-Latn-CS" smtClean="0"/>
               <a:pPr/>
-              <a:t>21.1.2020.</a:t>
+              <a:t>14.3.2020.</a:t>
             </a:fld>
             <a:endParaRPr lang="hr-HR"/>
           </a:p>
@@ -2514,7 +2517,7 @@
             <a:fld id="{52713974-83E4-49FC-AB57-17EEA02D934E}" type="datetimeFigureOut">
               <a:rPr lang="sr-Latn-CS" smtClean="0"/>
               <a:pPr/>
-              <a:t>21.1.2020.</a:t>
+              <a:t>14.3.2020.</a:t>
             </a:fld>
             <a:endParaRPr lang="hr-HR"/>
           </a:p>
@@ -2750,7 +2753,7 @@
             <a:fld id="{52713974-83E4-49FC-AB57-17EEA02D934E}" type="datetimeFigureOut">
               <a:rPr lang="sr-Latn-CS" smtClean="0"/>
               <a:pPr/>
-              <a:t>21.1.2020.</a:t>
+              <a:t>14.3.2020.</a:t>
             </a:fld>
             <a:endParaRPr lang="hr-HR" dirty="0"/>
           </a:p>
@@ -3205,12 +3208,12 @@
           <a:lstStyle/>
           <a:p>
             <a:r>
-              <a:rPr lang="hr-HR" sz="3600" dirty="0" err="1"/>
+              <a:rPr lang="en-GB" sz="3600" dirty="0" err="1"/>
               <a:t>MaxDiff</a:t>
             </a:r>
             <a:r>
               <a:rPr lang="en-GB" sz="3600" dirty="0"/>
-              <a:t> market research and data analysis</a:t>
+              <a:t> (aka Best-Worst) Market Research and Data Analysis</a:t>
             </a:r>
           </a:p>
         </p:txBody>
@@ -3263,7 +3266,15 @@
           <a:p>
             <a:r>
               <a:rPr lang="en-GB" b="1" dirty="0"/>
-              <a:t>Step 1: problem definition</a:t>
+              <a:t>Some </a:t>
+            </a:r>
+            <a:r>
+              <a:rPr lang="hr-HR" b="1" dirty="0" err="1"/>
+              <a:t>MaxDiff</a:t>
+            </a:r>
+            <a:r>
+              <a:rPr lang="en-GB" b="1" dirty="0"/>
+              <a:t> Usage Examples</a:t>
             </a:r>
           </a:p>
         </p:txBody>
@@ -3291,62 +3302,59 @@
           </a:bodyPr>
           <a:lstStyle/>
           <a:p>
-            <a:r>
-              <a:rPr lang="en-GB" dirty="0"/>
-              <a:t>The first step is the problem definition, e.g.:</a:t>
-            </a:r>
-          </a:p>
-          <a:p>
-            <a:pPr lvl="1"/>
-            <a:r>
-              <a:rPr lang="en-GB" dirty="0"/>
-              <a:t>We are </a:t>
-            </a:r>
-            <a:r>
-              <a:rPr lang="en-GB" b="1" dirty="0"/>
-              <a:t>planning a new product </a:t>
-            </a:r>
-            <a:r>
-              <a:rPr lang="en-GB" dirty="0"/>
-              <a:t>and we want to see which one would do the best in the market</a:t>
-            </a:r>
-          </a:p>
-          <a:p>
-            <a:pPr lvl="1"/>
-            <a:r>
-              <a:rPr lang="en-GB" dirty="0"/>
-              <a:t>We are interested in how do </a:t>
-            </a:r>
-            <a:r>
-              <a:rPr lang="en-GB" b="1" dirty="0"/>
-              <a:t>people value </a:t>
-            </a:r>
-            <a:r>
-              <a:rPr lang="en-GB" dirty="0"/>
-              <a:t>our products</a:t>
-            </a:r>
-          </a:p>
-          <a:p>
-            <a:pPr lvl="1"/>
-            <a:r>
-              <a:rPr lang="en-GB" dirty="0"/>
-              <a:t>We are interested in what do our </a:t>
-            </a:r>
-            <a:r>
-              <a:rPr lang="hr-HR" b="1" dirty="0" err="1"/>
-              <a:t>people</a:t>
-            </a:r>
-            <a:r>
-              <a:rPr lang="en-GB" b="1" dirty="0"/>
-              <a:t> like</a:t>
-            </a:r>
-            <a:r>
-              <a:rPr lang="en-GB" dirty="0"/>
-              <a:t> and what they like less </a:t>
-            </a:r>
-            <a:r>
-              <a:rPr lang="en-GB" b="1" dirty="0"/>
-              <a:t>or don’t like</a:t>
+            <a:pPr marL="0" indent="0">
+              <a:buNone/>
+            </a:pPr>
+            <a:r>
+              <a:rPr lang="en-GB" dirty="0"/>
+              <a:t>Testing different:</a:t>
+            </a:r>
+          </a:p>
+          <a:p>
+            <a:r>
+              <a:rPr lang="en-GB" dirty="0"/>
+              <a:t>Dishes from a </a:t>
+            </a:r>
+            <a:r>
+              <a:rPr lang="hr-HR" dirty="0"/>
+              <a:t>restaurant </a:t>
+            </a:r>
+            <a:r>
+              <a:rPr lang="en-GB" dirty="0"/>
+              <a:t>menu</a:t>
+            </a:r>
+          </a:p>
+          <a:p>
+            <a:r>
+              <a:rPr lang="en-GB" dirty="0"/>
+              <a:t>Tourist/travel packages</a:t>
+            </a:r>
+          </a:p>
+          <a:p>
+            <a:r>
+              <a:rPr lang="en-GB" dirty="0"/>
+              <a:t>Cell-phones</a:t>
+            </a:r>
+          </a:p>
+          <a:p>
+            <a:r>
+              <a:rPr lang="en-GB" dirty="0"/>
+              <a:t>Employees benefits packages</a:t>
+            </a:r>
+          </a:p>
+          <a:p>
+            <a:r>
+              <a:rPr lang="en-GB" dirty="0"/>
+              <a:t>Mobile subscriptions</a:t>
+            </a:r>
+          </a:p>
+          <a:p>
+            <a:pPr marL="0" indent="0">
+              <a:buNone/>
+            </a:pPr>
+            <a:r>
+              <a:rPr lang="en-GB" dirty="0"/>
+              <a:t>to find the most valued product/option</a:t>
             </a:r>
           </a:p>
         </p:txBody>
@@ -3354,7 +3362,7 @@
     </p:spTree>
     <p:extLst>
       <p:ext uri="{BB962C8B-B14F-4D97-AF65-F5344CB8AC3E}">
-        <p14:creationId xmlns:p14="http://schemas.microsoft.com/office/powerpoint/2010/main" val="389459951"/>
+        <p14:creationId xmlns:p14="http://schemas.microsoft.com/office/powerpoint/2010/main" val="990381928"/>
       </p:ext>
     </p:extLst>
   </p:cSld>
@@ -3383,10 +3391,10 @@
       </p:grpSpPr>
       <p:sp>
         <p:nvSpPr>
-          <p:cNvPr id="3" name="Naslov 2">
+          <p:cNvPr id="4" name="Naslov 3">
             <a:extLst>
               <a:ext uri="{FF2B5EF4-FFF2-40B4-BE49-F238E27FC236}">
-                <a16:creationId xmlns:a16="http://schemas.microsoft.com/office/drawing/2014/main" id="{2CABC428-AD66-468E-976E-4D8517731473}"/>
+                <a16:creationId xmlns:a16="http://schemas.microsoft.com/office/drawing/2014/main" id="{8336E22B-76C4-4599-9A12-9962CEED1441}"/>
               </a:ext>
             </a:extLst>
           </p:cNvPr>
@@ -3403,26 +3411,18 @@
           <a:lstStyle/>
           <a:p>
             <a:r>
-              <a:rPr lang="en-GB" b="1" dirty="0"/>
-              <a:t>Step 2: </a:t>
-            </a:r>
-            <a:r>
-              <a:rPr lang="hr-HR" b="1" dirty="0" err="1"/>
-              <a:t>products</a:t>
-            </a:r>
-            <a:r>
-              <a:rPr lang="en-GB" b="1" dirty="0"/>
-              <a:t> definition</a:t>
-            </a:r>
-          </a:p>
-        </p:txBody>
-      </p:sp>
-      <p:sp>
-        <p:nvSpPr>
-          <p:cNvPr id="6" name="Rezervirano mjesto sadržaja 5">
+              <a:rPr lang="en-GB" dirty="0"/>
+              <a:t>steps</a:t>
+            </a:r>
+          </a:p>
+        </p:txBody>
+      </p:sp>
+      <p:sp>
+        <p:nvSpPr>
+          <p:cNvPr id="5" name="Rezervirano mjesto teksta 4">
             <a:extLst>
               <a:ext uri="{FF2B5EF4-FFF2-40B4-BE49-F238E27FC236}">
-                <a16:creationId xmlns:a16="http://schemas.microsoft.com/office/drawing/2014/main" id="{086DAD2F-4774-4F7D-B820-2FD9E41F13D4}"/>
+                <a16:creationId xmlns:a16="http://schemas.microsoft.com/office/drawing/2014/main" id="{16579881-AFAA-4AE5-8C91-EE31693372E0}"/>
               </a:ext>
             </a:extLst>
           </p:cNvPr>
@@ -3430,57 +3430,66 @@
             <a:spLocks noGrp="1"/>
           </p:cNvSpPr>
           <p:nvPr>
-            <p:ph idx="1"/>
-          </p:nvPr>
-        </p:nvSpPr>
-        <p:spPr/>
-        <p:txBody>
-          <a:bodyPr>
-            <a:normAutofit/>
-          </a:bodyPr>
-          <a:lstStyle/>
-          <a:p>
-            <a:r>
-              <a:rPr lang="en-GB" dirty="0"/>
-              <a:t>Definition of the </a:t>
-            </a:r>
-            <a:r>
-              <a:rPr lang="en-GB" b="1" dirty="0"/>
-              <a:t>products </a:t>
-            </a:r>
-            <a:r>
-              <a:rPr lang="en-GB" dirty="0"/>
-              <a:t>that we wish to analyse, e.g.:</a:t>
-            </a:r>
-          </a:p>
-          <a:p>
-            <a:pPr lvl="1"/>
-            <a:r>
-              <a:rPr lang="en-GB" dirty="0"/>
-              <a:t>Cars: Mercedes, Fiat, Opel</a:t>
-            </a:r>
-          </a:p>
-          <a:p>
-            <a:pPr lvl="1"/>
-            <a:r>
-              <a:rPr lang="en-GB" dirty="0"/>
-              <a:t>Pizzas: vegetarian, spicy, with mushrooms</a:t>
-            </a:r>
-          </a:p>
-          <a:p>
-            <a:pPr lvl="1"/>
-            <a:r>
-              <a:rPr lang="en-GB" dirty="0"/>
-              <a:t>Jeans: slim, regular, skinny fit</a:t>
-            </a:r>
-            <a:endParaRPr lang="hr-HR" dirty="0"/>
+            <p:ph type="body" idx="1"/>
+          </p:nvPr>
+        </p:nvSpPr>
+        <p:spPr/>
+        <p:txBody>
+          <a:bodyPr/>
+          <a:lstStyle/>
+          <a:p>
+            <a:r>
+              <a:rPr lang="en-GB" dirty="0"/>
+              <a:t>Description of </a:t>
+            </a:r>
+            <a:r>
+              <a:rPr lang="hr-HR" dirty="0"/>
+              <a:t>S</a:t>
+            </a:r>
+            <a:r>
+              <a:rPr lang="en-GB" dirty="0" err="1"/>
+              <a:t>teps</a:t>
+            </a:r>
+            <a:r>
+              <a:rPr lang="en-GB" dirty="0"/>
+              <a:t> in a </a:t>
+            </a:r>
+            <a:r>
+              <a:rPr lang="hr-HR" dirty="0" err="1"/>
+              <a:t>MaxDiff</a:t>
+            </a:r>
+            <a:r>
+              <a:rPr lang="en-GB" dirty="0"/>
+              <a:t> </a:t>
+            </a:r>
+            <a:r>
+              <a:rPr lang="hr-HR" dirty="0"/>
+              <a:t>P</a:t>
+            </a:r>
+            <a:r>
+              <a:rPr lang="en-GB" dirty="0" err="1"/>
+              <a:t>roject</a:t>
+            </a:r>
+            <a:r>
+              <a:rPr lang="en-GB" dirty="0"/>
+              <a:t> </a:t>
+            </a:r>
+            <a:r>
+              <a:rPr lang="hr-HR" dirty="0"/>
+              <a:t>I</a:t>
+            </a:r>
+            <a:r>
+              <a:rPr lang="en-GB" dirty="0" err="1"/>
+              <a:t>mplementation</a:t>
+            </a:r>
+            <a:endParaRPr lang="en-GB" dirty="0"/>
           </a:p>
         </p:txBody>
       </p:sp>
     </p:spTree>
     <p:extLst>
       <p:ext uri="{BB962C8B-B14F-4D97-AF65-F5344CB8AC3E}">
-        <p14:creationId xmlns:p14="http://schemas.microsoft.com/office/powerpoint/2010/main" val="1686423361"/>
+        <p14:creationId xmlns:p14="http://schemas.microsoft.com/office/powerpoint/2010/main" val="3315692912"/>
       </p:ext>
     </p:extLst>
   </p:cSld>
@@ -3530,8 +3539,29 @@
           <a:p>
             <a:r>
               <a:rPr lang="en-GB" b="1" dirty="0"/>
-              <a:t>Step 3: design definition</a:t>
-            </a:r>
+              <a:t>Step 1: </a:t>
+            </a:r>
+            <a:r>
+              <a:rPr lang="hr-HR" b="1" dirty="0"/>
+              <a:t>P</a:t>
+            </a:r>
+            <a:r>
+              <a:rPr lang="en-GB" b="1" dirty="0" err="1"/>
+              <a:t>roblem</a:t>
+            </a:r>
+            <a:r>
+              <a:rPr lang="en-GB" b="1" dirty="0"/>
+              <a:t> </a:t>
+            </a:r>
+            <a:r>
+              <a:rPr lang="hr-HR" b="1" dirty="0"/>
+              <a:t>D</a:t>
+            </a:r>
+            <a:r>
+              <a:rPr lang="en-GB" b="1" dirty="0" err="1"/>
+              <a:t>efinition</a:t>
+            </a:r>
+            <a:endParaRPr lang="en-GB" b="1" dirty="0"/>
           </a:p>
         </p:txBody>
       </p:sp>
@@ -3560,55 +3590,96 @@
           <a:p>
             <a:r>
               <a:rPr lang="en-GB" dirty="0"/>
-              <a:t>Design definition means building and combining </a:t>
+              <a:t>The first step is the problem definition, e.g.:</a:t>
+            </a:r>
+          </a:p>
+          <a:p>
+            <a:pPr lvl="1"/>
+            <a:r>
+              <a:rPr lang="en-GB" dirty="0"/>
+              <a:t>We are </a:t>
             </a:r>
             <a:r>
               <a:rPr lang="en-GB" b="1" dirty="0"/>
-              <a:t>alternatives (products)</a:t>
-            </a:r>
-            <a:r>
-              <a:rPr lang="en-GB" dirty="0"/>
-              <a:t> into </a:t>
+              <a:t>planning a </a:t>
+            </a:r>
+            <a:r>
+              <a:rPr lang="hr-HR" b="1" dirty="0" err="1"/>
+              <a:t>few</a:t>
+            </a:r>
+            <a:r>
+              <a:rPr lang="hr-HR" b="1" dirty="0"/>
+              <a:t> </a:t>
             </a:r>
             <a:r>
               <a:rPr lang="en-GB" b="1" dirty="0"/>
-              <a:t>questions </a:t>
-            </a:r>
-            <a:r>
-              <a:rPr lang="en-GB" dirty="0"/>
-              <a:t>and </a:t>
+              <a:t>new product</a:t>
+            </a:r>
+            <a:r>
+              <a:rPr lang="hr-HR" b="1" dirty="0"/>
+              <a:t>s</a:t>
             </a:r>
             <a:r>
               <a:rPr lang="en-GB" b="1" dirty="0"/>
-              <a:t>surveys</a:t>
-            </a:r>
-            <a:endParaRPr lang="en-GB" dirty="0"/>
-          </a:p>
-          <a:p>
-            <a:r>
-              <a:rPr lang="en-GB" dirty="0"/>
-              <a:t>With respect to (typically) a </a:t>
+              <a:t> </a:t>
+            </a:r>
+            <a:r>
+              <a:rPr lang="en-GB" dirty="0"/>
+              <a:t>and we want to see which one would do the best in the market</a:t>
+            </a:r>
+          </a:p>
+          <a:p>
+            <a:pPr lvl="1"/>
+            <a:r>
+              <a:rPr lang="en-GB" dirty="0"/>
+              <a:t>We are interested in how do </a:t>
             </a:r>
             <a:r>
               <a:rPr lang="en-GB" b="1" dirty="0"/>
-              <a:t>large number </a:t>
-            </a:r>
-            <a:r>
-              <a:rPr lang="en-GB" dirty="0"/>
-              <a:t>of all possible combinations, we choose only a part of them, and this part has to be chosen so that we </a:t>
+              <a:t>people value </a:t>
+            </a:r>
+            <a:r>
+              <a:rPr lang="en-GB" dirty="0"/>
+              <a:t>our products</a:t>
+            </a:r>
+          </a:p>
+          <a:p>
+            <a:pPr lvl="1"/>
+            <a:r>
+              <a:rPr lang="en-GB" dirty="0"/>
+              <a:t>We are interested in what do our </a:t>
+            </a:r>
+            <a:r>
+              <a:rPr lang="hr-HR" b="1" dirty="0" err="1"/>
+              <a:t>people</a:t>
             </a:r>
             <a:r>
               <a:rPr lang="en-GB" b="1" dirty="0"/>
-              <a:t>can calculate the products coefficients</a:t>
-            </a:r>
-            <a:endParaRPr lang="en-GB" dirty="0"/>
+              <a:t> like</a:t>
+            </a:r>
+            <a:r>
+              <a:rPr lang="en-GB" dirty="0"/>
+              <a:t> and what they like less </a:t>
+            </a:r>
+            <a:r>
+              <a:rPr lang="en-GB" b="1" dirty="0"/>
+              <a:t>or d</a:t>
+            </a:r>
+            <a:r>
+              <a:rPr lang="hr-HR" b="1" dirty="0" err="1"/>
+              <a:t>is</a:t>
+            </a:r>
+            <a:r>
+              <a:rPr lang="en-GB" b="1" dirty="0"/>
+              <a:t>like</a:t>
+            </a:r>
           </a:p>
         </p:txBody>
       </p:sp>
     </p:spTree>
     <p:extLst>
       <p:ext uri="{BB962C8B-B14F-4D97-AF65-F5344CB8AC3E}">
-        <p14:creationId xmlns:p14="http://schemas.microsoft.com/office/powerpoint/2010/main" val="1553390483"/>
+        <p14:creationId xmlns:p14="http://schemas.microsoft.com/office/powerpoint/2010/main" val="389459951"/>
       </p:ext>
     </p:extLst>
   </p:cSld>
@@ -3658,8 +3729,323 @@
           <a:p>
             <a:r>
               <a:rPr lang="en-GB" b="1" dirty="0"/>
-              <a:t>Step 4: design testing</a:t>
-            </a:r>
+              <a:t>Step 2: </a:t>
+            </a:r>
+            <a:r>
+              <a:rPr lang="hr-HR" b="1" dirty="0"/>
+              <a:t>Products</a:t>
+            </a:r>
+            <a:r>
+              <a:rPr lang="en-GB" b="1" dirty="0"/>
+              <a:t> </a:t>
+            </a:r>
+            <a:r>
+              <a:rPr lang="hr-HR" b="1" dirty="0"/>
+              <a:t>D</a:t>
+            </a:r>
+            <a:r>
+              <a:rPr lang="en-GB" b="1" dirty="0" err="1"/>
+              <a:t>efinition</a:t>
+            </a:r>
+            <a:endParaRPr lang="en-GB" b="1" dirty="0"/>
+          </a:p>
+        </p:txBody>
+      </p:sp>
+      <p:sp>
+        <p:nvSpPr>
+          <p:cNvPr id="6" name="Rezervirano mjesto sadržaja 5">
+            <a:extLst>
+              <a:ext uri="{FF2B5EF4-FFF2-40B4-BE49-F238E27FC236}">
+                <a16:creationId xmlns:a16="http://schemas.microsoft.com/office/drawing/2014/main" id="{086DAD2F-4774-4F7D-B820-2FD9E41F13D4}"/>
+              </a:ext>
+            </a:extLst>
+          </p:cNvPr>
+          <p:cNvSpPr>
+            <a:spLocks noGrp="1"/>
+          </p:cNvSpPr>
+          <p:nvPr>
+            <p:ph idx="1"/>
+          </p:nvPr>
+        </p:nvSpPr>
+        <p:spPr/>
+        <p:txBody>
+          <a:bodyPr>
+            <a:normAutofit/>
+          </a:bodyPr>
+          <a:lstStyle/>
+          <a:p>
+            <a:r>
+              <a:rPr lang="en-GB" dirty="0"/>
+              <a:t>Definition of the </a:t>
+            </a:r>
+            <a:r>
+              <a:rPr lang="en-GB" b="1" dirty="0"/>
+              <a:t>products </a:t>
+            </a:r>
+            <a:r>
+              <a:rPr lang="en-GB" dirty="0"/>
+              <a:t>that we wish to analyse, e.g.:</a:t>
+            </a:r>
+          </a:p>
+          <a:p>
+            <a:pPr lvl="1"/>
+            <a:r>
+              <a:rPr lang="en-GB" dirty="0"/>
+              <a:t>Cars: Mercedes, Fiat, Opel</a:t>
+            </a:r>
+          </a:p>
+          <a:p>
+            <a:pPr lvl="1"/>
+            <a:r>
+              <a:rPr lang="en-GB" dirty="0"/>
+              <a:t>Pizzas: vegetarian, spicy, with mushrooms</a:t>
+            </a:r>
+          </a:p>
+          <a:p>
+            <a:pPr lvl="1"/>
+            <a:r>
+              <a:rPr lang="en-GB" dirty="0"/>
+              <a:t>Jeans: slim, regular, skinny fit</a:t>
+            </a:r>
+          </a:p>
+          <a:p>
+            <a:pPr lvl="1"/>
+            <a:r>
+              <a:rPr lang="en-GB" dirty="0"/>
+              <a:t>Mobile subscriptions: flat Internet, limited minutes, discounted international calls</a:t>
+            </a:r>
+          </a:p>
+        </p:txBody>
+      </p:sp>
+    </p:spTree>
+    <p:extLst>
+      <p:ext uri="{BB962C8B-B14F-4D97-AF65-F5344CB8AC3E}">
+        <p14:creationId xmlns:p14="http://schemas.microsoft.com/office/powerpoint/2010/main" val="1686423361"/>
+      </p:ext>
+    </p:extLst>
+  </p:cSld>
+  <p:clrMapOvr>
+    <a:masterClrMapping/>
+  </p:clrMapOvr>
+</p:sld>
+</file>
+
+<file path=ppt/slides/slide14.xml><?xml version="1.0" encoding="utf-8"?>
+<p:sld xmlns:a="http://schemas.openxmlformats.org/drawingml/2006/main" xmlns:r="http://schemas.openxmlformats.org/officeDocument/2006/relationships" xmlns:p="http://schemas.openxmlformats.org/presentationml/2006/main">
+  <p:cSld>
+    <p:spTree>
+      <p:nvGrpSpPr>
+        <p:cNvPr id="1" name=""/>
+        <p:cNvGrpSpPr/>
+        <p:nvPr/>
+      </p:nvGrpSpPr>
+      <p:grpSpPr>
+        <a:xfrm>
+          <a:off x="0" y="0"/>
+          <a:ext cx="0" cy="0"/>
+          <a:chOff x="0" y="0"/>
+          <a:chExt cx="0" cy="0"/>
+        </a:xfrm>
+      </p:grpSpPr>
+      <p:sp>
+        <p:nvSpPr>
+          <p:cNvPr id="3" name="Naslov 2">
+            <a:extLst>
+              <a:ext uri="{FF2B5EF4-FFF2-40B4-BE49-F238E27FC236}">
+                <a16:creationId xmlns:a16="http://schemas.microsoft.com/office/drawing/2014/main" id="{2CABC428-AD66-468E-976E-4D8517731473}"/>
+              </a:ext>
+            </a:extLst>
+          </p:cNvPr>
+          <p:cNvSpPr>
+            <a:spLocks noGrp="1"/>
+          </p:cNvSpPr>
+          <p:nvPr>
+            <p:ph type="title"/>
+          </p:nvPr>
+        </p:nvSpPr>
+        <p:spPr/>
+        <p:txBody>
+          <a:bodyPr/>
+          <a:lstStyle/>
+          <a:p>
+            <a:r>
+              <a:rPr lang="en-GB" b="1" dirty="0"/>
+              <a:t>Step 3: </a:t>
+            </a:r>
+            <a:r>
+              <a:rPr lang="hr-HR" b="1" dirty="0"/>
+              <a:t>D</a:t>
+            </a:r>
+            <a:r>
+              <a:rPr lang="en-GB" b="1" dirty="0" err="1"/>
+              <a:t>esign</a:t>
+            </a:r>
+            <a:r>
+              <a:rPr lang="en-GB" b="1" dirty="0"/>
+              <a:t> </a:t>
+            </a:r>
+            <a:r>
+              <a:rPr lang="hr-HR" b="1" dirty="0"/>
+              <a:t>D</a:t>
+            </a:r>
+            <a:r>
+              <a:rPr lang="en-GB" b="1" dirty="0" err="1"/>
+              <a:t>efinition</a:t>
+            </a:r>
+            <a:endParaRPr lang="en-GB" b="1" dirty="0"/>
+          </a:p>
+        </p:txBody>
+      </p:sp>
+      <p:sp>
+        <p:nvSpPr>
+          <p:cNvPr id="6" name="Rezervirano mjesto sadržaja 5">
+            <a:extLst>
+              <a:ext uri="{FF2B5EF4-FFF2-40B4-BE49-F238E27FC236}">
+                <a16:creationId xmlns:a16="http://schemas.microsoft.com/office/drawing/2014/main" id="{086DAD2F-4774-4F7D-B820-2FD9E41F13D4}"/>
+              </a:ext>
+            </a:extLst>
+          </p:cNvPr>
+          <p:cNvSpPr>
+            <a:spLocks noGrp="1"/>
+          </p:cNvSpPr>
+          <p:nvPr>
+            <p:ph idx="1"/>
+          </p:nvPr>
+        </p:nvSpPr>
+        <p:spPr/>
+        <p:txBody>
+          <a:bodyPr>
+            <a:normAutofit/>
+          </a:bodyPr>
+          <a:lstStyle/>
+          <a:p>
+            <a:r>
+              <a:rPr lang="en-GB" dirty="0"/>
+              <a:t>Design definition means building and combining </a:t>
+            </a:r>
+            <a:r>
+              <a:rPr lang="en-GB" b="1" dirty="0"/>
+              <a:t>alternatives (products)</a:t>
+            </a:r>
+            <a:r>
+              <a:rPr lang="en-GB" dirty="0"/>
+              <a:t> into </a:t>
+            </a:r>
+            <a:r>
+              <a:rPr lang="en-GB" b="1" dirty="0"/>
+              <a:t>questions </a:t>
+            </a:r>
+            <a:r>
+              <a:rPr lang="en-GB" dirty="0"/>
+              <a:t>and </a:t>
+            </a:r>
+            <a:r>
+              <a:rPr lang="en-GB" b="1" dirty="0"/>
+              <a:t>surveys</a:t>
+            </a:r>
+            <a:endParaRPr lang="en-GB" dirty="0"/>
+          </a:p>
+          <a:p>
+            <a:r>
+              <a:rPr lang="en-GB" dirty="0"/>
+              <a:t>With respect to (typically) a </a:t>
+            </a:r>
+            <a:r>
+              <a:rPr lang="en-GB" b="1" dirty="0"/>
+              <a:t>large number </a:t>
+            </a:r>
+            <a:r>
+              <a:rPr lang="en-GB" dirty="0"/>
+              <a:t>of all possible combinations, we choose only a part of them, and this part has to be chosen so that we </a:t>
+            </a:r>
+            <a:r>
+              <a:rPr lang="en-GB" b="1" dirty="0"/>
+              <a:t>can calculate the products </a:t>
+            </a:r>
+            <a:r>
+              <a:rPr lang="hr-HR" b="1" dirty="0" err="1"/>
+              <a:t>values</a:t>
+            </a:r>
+            <a:endParaRPr lang="en-GB" dirty="0"/>
+          </a:p>
+        </p:txBody>
+      </p:sp>
+    </p:spTree>
+    <p:extLst>
+      <p:ext uri="{BB962C8B-B14F-4D97-AF65-F5344CB8AC3E}">
+        <p14:creationId xmlns:p14="http://schemas.microsoft.com/office/powerpoint/2010/main" val="1553390483"/>
+      </p:ext>
+    </p:extLst>
+  </p:cSld>
+  <p:clrMapOvr>
+    <a:masterClrMapping/>
+  </p:clrMapOvr>
+</p:sld>
+</file>
+
+<file path=ppt/slides/slide15.xml><?xml version="1.0" encoding="utf-8"?>
+<p:sld xmlns:a="http://schemas.openxmlformats.org/drawingml/2006/main" xmlns:r="http://schemas.openxmlformats.org/officeDocument/2006/relationships" xmlns:p="http://schemas.openxmlformats.org/presentationml/2006/main">
+  <p:cSld>
+    <p:spTree>
+      <p:nvGrpSpPr>
+        <p:cNvPr id="1" name=""/>
+        <p:cNvGrpSpPr/>
+        <p:nvPr/>
+      </p:nvGrpSpPr>
+      <p:grpSpPr>
+        <a:xfrm>
+          <a:off x="0" y="0"/>
+          <a:ext cx="0" cy="0"/>
+          <a:chOff x="0" y="0"/>
+          <a:chExt cx="0" cy="0"/>
+        </a:xfrm>
+      </p:grpSpPr>
+      <p:sp>
+        <p:nvSpPr>
+          <p:cNvPr id="3" name="Naslov 2">
+            <a:extLst>
+              <a:ext uri="{FF2B5EF4-FFF2-40B4-BE49-F238E27FC236}">
+                <a16:creationId xmlns:a16="http://schemas.microsoft.com/office/drawing/2014/main" id="{2CABC428-AD66-468E-976E-4D8517731473}"/>
+              </a:ext>
+            </a:extLst>
+          </p:cNvPr>
+          <p:cNvSpPr>
+            <a:spLocks noGrp="1"/>
+          </p:cNvSpPr>
+          <p:nvPr>
+            <p:ph type="title"/>
+          </p:nvPr>
+        </p:nvSpPr>
+        <p:spPr/>
+        <p:txBody>
+          <a:bodyPr/>
+          <a:lstStyle/>
+          <a:p>
+            <a:r>
+              <a:rPr lang="en-GB" b="1" dirty="0"/>
+              <a:t>Step 4: </a:t>
+            </a:r>
+            <a:r>
+              <a:rPr lang="hr-HR" b="1" dirty="0"/>
+              <a:t>D</a:t>
+            </a:r>
+            <a:r>
+              <a:rPr lang="en-GB" b="1" dirty="0" err="1"/>
+              <a:t>esign</a:t>
+            </a:r>
+            <a:r>
+              <a:rPr lang="en-GB" b="1" dirty="0"/>
+              <a:t> </a:t>
+            </a:r>
+            <a:r>
+              <a:rPr lang="hr-HR" b="1" dirty="0"/>
+              <a:t>T</a:t>
+            </a:r>
+            <a:r>
+              <a:rPr lang="en-GB" b="1" dirty="0" err="1"/>
+              <a:t>esting</a:t>
+            </a:r>
+            <a:endParaRPr lang="en-GB" b="1" dirty="0"/>
           </a:p>
         </p:txBody>
       </p:sp>
@@ -3754,7 +4140,7 @@
 </p:sld>
 </file>
 
-<file path=ppt/slides/slide14.xml><?xml version="1.0" encoding="utf-8"?>
+<file path=ppt/slides/slide16.xml><?xml version="1.0" encoding="utf-8"?>
 <p:sld xmlns:a="http://schemas.openxmlformats.org/drawingml/2006/main" xmlns:r="http://schemas.openxmlformats.org/officeDocument/2006/relationships" xmlns:p="http://schemas.openxmlformats.org/presentationml/2006/main">
   <p:cSld>
     <p:spTree>
@@ -3796,8 +4182,29 @@
           <a:p>
             <a:r>
               <a:rPr lang="en-GB" b="1" dirty="0"/>
-              <a:t>Step 5: survey implementation</a:t>
-            </a:r>
+              <a:t>Step 5: </a:t>
+            </a:r>
+            <a:r>
+              <a:rPr lang="hr-HR" b="1" dirty="0"/>
+              <a:t>S</a:t>
+            </a:r>
+            <a:r>
+              <a:rPr lang="en-GB" b="1" dirty="0" err="1"/>
+              <a:t>urvey</a:t>
+            </a:r>
+            <a:r>
+              <a:rPr lang="en-GB" b="1" dirty="0"/>
+              <a:t> </a:t>
+            </a:r>
+            <a:r>
+              <a:rPr lang="hr-HR" b="1" dirty="0"/>
+              <a:t>I</a:t>
+            </a:r>
+            <a:r>
+              <a:rPr lang="en-GB" b="1" dirty="0" err="1"/>
+              <a:t>mplementation</a:t>
+            </a:r>
+            <a:endParaRPr lang="en-GB" b="1" dirty="0"/>
           </a:p>
         </p:txBody>
       </p:sp>
@@ -3888,7 +4295,7 @@
 </p:sld>
 </file>
 
-<file path=ppt/slides/slide15.xml><?xml version="1.0" encoding="utf-8"?>
+<file path=ppt/slides/slide17.xml><?xml version="1.0" encoding="utf-8"?>
 <p:sld xmlns:a="http://schemas.openxmlformats.org/drawingml/2006/main" xmlns:r="http://schemas.openxmlformats.org/officeDocument/2006/relationships" xmlns:p="http://schemas.openxmlformats.org/presentationml/2006/main">
   <p:cSld>
     <p:spTree>
@@ -3928,7 +4335,15 @@
           <a:p>
             <a:r>
               <a:rPr lang="en-GB" b="1" dirty="0"/>
-              <a:t>Step 6: initiating the survey</a:t>
+              <a:t>Step 6: </a:t>
+            </a:r>
+            <a:r>
+              <a:rPr lang="hr-HR" b="1" dirty="0" err="1"/>
+              <a:t>Running</a:t>
+            </a:r>
+            <a:r>
+              <a:rPr lang="en-GB" b="1" dirty="0"/>
+              <a:t> the survey</a:t>
             </a:r>
           </a:p>
         </p:txBody>
@@ -3974,7 +4389,15 @@
             </a:r>
             <a:r>
               <a:rPr lang="en-GB" dirty="0"/>
-              <a:t>…), initiate the survey</a:t>
+              <a:t>…), </a:t>
+            </a:r>
+            <a:r>
+              <a:rPr lang="hr-HR" dirty="0" err="1"/>
+              <a:t>run</a:t>
+            </a:r>
+            <a:r>
+              <a:rPr lang="en-GB" dirty="0"/>
+              <a:t> the survey</a:t>
             </a:r>
           </a:p>
         </p:txBody>
@@ -4028,312 +4451,6 @@
 </p:sld>
 </file>
 
-<file path=ppt/slides/slide16.xml><?xml version="1.0" encoding="utf-8"?>
-<p:sld xmlns:a="http://schemas.openxmlformats.org/drawingml/2006/main" xmlns:r="http://schemas.openxmlformats.org/officeDocument/2006/relationships" xmlns:p="http://schemas.openxmlformats.org/presentationml/2006/main">
-  <p:cSld>
-    <p:spTree>
-      <p:nvGrpSpPr>
-        <p:cNvPr id="1" name=""/>
-        <p:cNvGrpSpPr/>
-        <p:nvPr/>
-      </p:nvGrpSpPr>
-      <p:grpSpPr>
-        <a:xfrm>
-          <a:off x="0" y="0"/>
-          <a:ext cx="0" cy="0"/>
-          <a:chOff x="0" y="0"/>
-          <a:chExt cx="0" cy="0"/>
-        </a:xfrm>
-      </p:grpSpPr>
-      <p:sp>
-        <p:nvSpPr>
-          <p:cNvPr id="3" name="Naslov 2">
-            <a:extLst>
-              <a:ext uri="{FF2B5EF4-FFF2-40B4-BE49-F238E27FC236}">
-                <a16:creationId xmlns:a16="http://schemas.microsoft.com/office/drawing/2014/main" id="{2CABC428-AD66-468E-976E-4D8517731473}"/>
-              </a:ext>
-            </a:extLst>
-          </p:cNvPr>
-          <p:cNvSpPr>
-            <a:spLocks noGrp="1"/>
-          </p:cNvSpPr>
-          <p:nvPr>
-            <p:ph type="title"/>
-          </p:nvPr>
-        </p:nvSpPr>
-        <p:spPr/>
-        <p:txBody>
-          <a:bodyPr/>
-          <a:lstStyle/>
-          <a:p>
-            <a:r>
-              <a:rPr lang="en-GB" b="1" dirty="0"/>
-              <a:t>Step 7: checking the answers</a:t>
-            </a:r>
-          </a:p>
-        </p:txBody>
-      </p:sp>
-      <p:sp>
-        <p:nvSpPr>
-          <p:cNvPr id="6" name="Rezervirano mjesto sadržaja 5">
-            <a:extLst>
-              <a:ext uri="{FF2B5EF4-FFF2-40B4-BE49-F238E27FC236}">
-                <a16:creationId xmlns:a16="http://schemas.microsoft.com/office/drawing/2014/main" id="{086DAD2F-4774-4F7D-B820-2FD9E41F13D4}"/>
-              </a:ext>
-            </a:extLst>
-          </p:cNvPr>
-          <p:cNvSpPr>
-            <a:spLocks noGrp="1"/>
-          </p:cNvSpPr>
-          <p:nvPr>
-            <p:ph idx="1"/>
-          </p:nvPr>
-        </p:nvSpPr>
-        <p:spPr/>
-        <p:txBody>
-          <a:bodyPr>
-            <a:normAutofit lnSpcReduction="10000"/>
-          </a:bodyPr>
-          <a:lstStyle/>
-          <a:p>
-            <a:r>
-              <a:rPr lang="en-GB" b="1" dirty="0"/>
-              <a:t>Check</a:t>
-            </a:r>
-            <a:r>
-              <a:rPr lang="en-GB" dirty="0"/>
-              <a:t> the answers and </a:t>
-            </a:r>
-            <a:r>
-              <a:rPr lang="en-GB" b="1" dirty="0"/>
-              <a:t>exclude</a:t>
-            </a:r>
-            <a:r>
-              <a:rPr lang="en-GB" dirty="0"/>
-              <a:t> from the analysis those that were e.g.:</a:t>
-            </a:r>
-          </a:p>
-          <a:p>
-            <a:pPr lvl="1"/>
-            <a:r>
-              <a:rPr lang="en-GB" dirty="0"/>
-              <a:t>always picking the same alternative (1st, 2nd…)</a:t>
-            </a:r>
-          </a:p>
-          <a:p>
-            <a:pPr lvl="1"/>
-            <a:r>
-              <a:rPr lang="en-GB" dirty="0"/>
-              <a:t>answering too quickly (less than a few seconds per question)</a:t>
-            </a:r>
-          </a:p>
-          <a:p>
-            <a:r>
-              <a:rPr lang="en-GB" dirty="0"/>
-              <a:t>This is an important step because „unreal” answers can significantly </a:t>
-            </a:r>
-            <a:r>
-              <a:rPr lang="en-GB" b="1" dirty="0"/>
-              <a:t>decrease the model quality</a:t>
-            </a:r>
-            <a:r>
-              <a:rPr lang="en-GB" dirty="0"/>
-              <a:t>, and sometimes event completely </a:t>
-            </a:r>
-            <a:r>
-              <a:rPr lang="en-GB" b="1" dirty="0"/>
-              <a:t>disable </a:t>
-            </a:r>
-            <a:r>
-              <a:rPr lang="en-GB" dirty="0"/>
-              <a:t>the model creation</a:t>
-            </a:r>
-          </a:p>
-        </p:txBody>
-      </p:sp>
-    </p:spTree>
-    <p:extLst>
-      <p:ext uri="{BB962C8B-B14F-4D97-AF65-F5344CB8AC3E}">
-        <p14:creationId xmlns:p14="http://schemas.microsoft.com/office/powerpoint/2010/main" val="2507376816"/>
-      </p:ext>
-    </p:extLst>
-  </p:cSld>
-  <p:clrMapOvr>
-    <a:masterClrMapping/>
-  </p:clrMapOvr>
-</p:sld>
-</file>
-
-<file path=ppt/slides/slide17.xml><?xml version="1.0" encoding="utf-8"?>
-<p:sld xmlns:a="http://schemas.openxmlformats.org/drawingml/2006/main" xmlns:r="http://schemas.openxmlformats.org/officeDocument/2006/relationships" xmlns:p="http://schemas.openxmlformats.org/presentationml/2006/main">
-  <p:cSld>
-    <p:spTree>
-      <p:nvGrpSpPr>
-        <p:cNvPr id="1" name=""/>
-        <p:cNvGrpSpPr/>
-        <p:nvPr/>
-      </p:nvGrpSpPr>
-      <p:grpSpPr>
-        <a:xfrm>
-          <a:off x="0" y="0"/>
-          <a:ext cx="0" cy="0"/>
-          <a:chOff x="0" y="0"/>
-          <a:chExt cx="0" cy="0"/>
-        </a:xfrm>
-      </p:grpSpPr>
-      <p:sp>
-        <p:nvSpPr>
-          <p:cNvPr id="3" name="Naslov 2">
-            <a:extLst>
-              <a:ext uri="{FF2B5EF4-FFF2-40B4-BE49-F238E27FC236}">
-                <a16:creationId xmlns:a16="http://schemas.microsoft.com/office/drawing/2014/main" id="{2CABC428-AD66-468E-976E-4D8517731473}"/>
-              </a:ext>
-            </a:extLst>
-          </p:cNvPr>
-          <p:cNvSpPr>
-            <a:spLocks noGrp="1"/>
-          </p:cNvSpPr>
-          <p:nvPr>
-            <p:ph type="title"/>
-          </p:nvPr>
-        </p:nvSpPr>
-        <p:spPr/>
-        <p:txBody>
-          <a:bodyPr/>
-          <a:lstStyle/>
-          <a:p>
-            <a:r>
-              <a:rPr lang="en-GB" b="1" dirty="0"/>
-              <a:t>Step 8: results analysis</a:t>
-            </a:r>
-          </a:p>
-        </p:txBody>
-      </p:sp>
-      <p:sp>
-        <p:nvSpPr>
-          <p:cNvPr id="6" name="Rezervirano mjesto sadržaja 5">
-            <a:extLst>
-              <a:ext uri="{FF2B5EF4-FFF2-40B4-BE49-F238E27FC236}">
-                <a16:creationId xmlns:a16="http://schemas.microsoft.com/office/drawing/2014/main" id="{086DAD2F-4774-4F7D-B820-2FD9E41F13D4}"/>
-              </a:ext>
-            </a:extLst>
-          </p:cNvPr>
-          <p:cNvSpPr>
-            <a:spLocks noGrp="1"/>
-          </p:cNvSpPr>
-          <p:nvPr>
-            <p:ph idx="1"/>
-          </p:nvPr>
-        </p:nvSpPr>
-        <p:spPr/>
-        <p:txBody>
-          <a:bodyPr>
-            <a:normAutofit fontScale="92500"/>
-          </a:bodyPr>
-          <a:lstStyle/>
-          <a:p>
-            <a:r>
-              <a:rPr lang="en-GB" dirty="0"/>
-              <a:t>Using the given answers, calculate the </a:t>
-            </a:r>
-            <a:r>
-              <a:rPr lang="en-GB" b="1" dirty="0"/>
-              <a:t>products coefficients </a:t>
-            </a:r>
-            <a:r>
-              <a:rPr lang="en-GB" dirty="0"/>
-              <a:t>and with them calculate e.g.</a:t>
-            </a:r>
-          </a:p>
-          <a:p>
-            <a:pPr lvl="1"/>
-            <a:r>
-              <a:rPr lang="en-GB" b="1" dirty="0"/>
-              <a:t>the best</a:t>
-            </a:r>
-            <a:r>
-              <a:rPr lang="en-GB" dirty="0"/>
-              <a:t> and </a:t>
-            </a:r>
-            <a:r>
-              <a:rPr lang="en-GB" b="1" dirty="0"/>
-              <a:t>the worst</a:t>
-            </a:r>
-            <a:r>
-              <a:rPr lang="en-GB" dirty="0"/>
-              <a:t> product</a:t>
-            </a:r>
-          </a:p>
-          <a:p>
-            <a:pPr lvl="1"/>
-            <a:r>
-              <a:rPr lang="en-GB" dirty="0"/>
-              <a:t>value </a:t>
-            </a:r>
-            <a:r>
-              <a:rPr lang="en-GB" b="1" dirty="0"/>
-              <a:t>ratios</a:t>
-            </a:r>
-            <a:r>
-              <a:rPr lang="en-GB" dirty="0"/>
-              <a:t> between the products</a:t>
-            </a:r>
-          </a:p>
-          <a:p>
-            <a:pPr lvl="1"/>
-            <a:r>
-              <a:rPr lang="en-GB" dirty="0"/>
-              <a:t>predicted </a:t>
-            </a:r>
-            <a:r>
-              <a:rPr lang="en-GB" b="1" dirty="0"/>
-              <a:t>sales share</a:t>
-            </a:r>
-            <a:r>
-              <a:rPr lang="en-GB" dirty="0"/>
-              <a:t> for some combinations of interest</a:t>
-            </a:r>
-          </a:p>
-          <a:p>
-            <a:pPr lvl="1"/>
-            <a:r>
-              <a:rPr lang="en-GB" b="1" dirty="0"/>
-              <a:t>the most </a:t>
-            </a:r>
-            <a:r>
-              <a:rPr lang="en-GB" b="1" dirty="0" err="1"/>
-              <a:t>benefitial</a:t>
-            </a:r>
-            <a:r>
-              <a:rPr lang="en-GB" b="1" dirty="0"/>
-              <a:t> combination/offer</a:t>
-            </a:r>
-            <a:r>
-              <a:rPr lang="en-GB" dirty="0"/>
-              <a:t> of products</a:t>
-            </a:r>
-          </a:p>
-          <a:p>
-            <a:r>
-              <a:rPr lang="en-GB" b="1" dirty="0"/>
-              <a:t>Respondents segmentation</a:t>
-            </a:r>
-          </a:p>
-        </p:txBody>
-      </p:sp>
-    </p:spTree>
-    <p:extLst>
-      <p:ext uri="{BB962C8B-B14F-4D97-AF65-F5344CB8AC3E}">
-        <p14:creationId xmlns:p14="http://schemas.microsoft.com/office/powerpoint/2010/main" val="2542513795"/>
-      </p:ext>
-    </p:extLst>
-  </p:cSld>
-  <p:clrMapOvr>
-    <a:masterClrMapping/>
-  </p:clrMapOvr>
-</p:sld>
-</file>
-
 <file path=ppt/slides/slide18.xml><?xml version="1.0" encoding="utf-8"?>
 <p:sld xmlns:a="http://schemas.openxmlformats.org/drawingml/2006/main" xmlns:r="http://schemas.openxmlformats.org/officeDocument/2006/relationships" xmlns:p="http://schemas.openxmlformats.org/presentationml/2006/main">
   <p:cSld>
@@ -4374,8 +4491,29 @@
           <a:p>
             <a:r>
               <a:rPr lang="en-GB" b="1" dirty="0"/>
-              <a:t>Step 9: using the results</a:t>
-            </a:r>
+              <a:t>Step 7: </a:t>
+            </a:r>
+            <a:r>
+              <a:rPr lang="hr-HR" b="1" dirty="0"/>
+              <a:t>C</a:t>
+            </a:r>
+            <a:r>
+              <a:rPr lang="en-GB" b="1" dirty="0" err="1"/>
+              <a:t>hecking</a:t>
+            </a:r>
+            <a:r>
+              <a:rPr lang="en-GB" b="1" dirty="0"/>
+              <a:t> the </a:t>
+            </a:r>
+            <a:r>
+              <a:rPr lang="hr-HR" b="1" dirty="0"/>
+              <a:t>A</a:t>
+            </a:r>
+            <a:r>
+              <a:rPr lang="en-GB" b="1" dirty="0" err="1"/>
+              <a:t>nswers</a:t>
+            </a:r>
+            <a:endParaRPr lang="en-GB" b="1" dirty="0"/>
           </a:p>
         </p:txBody>
       </p:sp>
@@ -4403,42 +4541,56 @@
           <a:lstStyle/>
           <a:p>
             <a:r>
-              <a:rPr lang="en-GB" dirty="0"/>
-              <a:t>Using the results analysis, make the </a:t>
-            </a:r>
-            <a:r>
               <a:rPr lang="en-GB" b="1" dirty="0"/>
-              <a:t>business decisions </a:t>
-            </a:r>
-            <a:r>
-              <a:rPr lang="en-GB" dirty="0"/>
-              <a:t>about new products, changing the existing or planned products, customer segmentation, marketing and sales adaptation…</a:t>
-            </a:r>
-          </a:p>
-          <a:p>
-            <a:r>
-              <a:rPr lang="en-GB" dirty="0"/>
-              <a:t>With the </a:t>
-            </a:r>
-            <a:r>
-              <a:rPr lang="en-GB" dirty="0" err="1"/>
-              <a:t>MaxDiff</a:t>
-            </a:r>
-            <a:r>
-              <a:rPr lang="en-GB" dirty="0"/>
-              <a:t> methodology, business decisions will be aligned with the customers valuations and this will ensure the </a:t>
+              <a:t>Check</a:t>
+            </a:r>
+            <a:r>
+              <a:rPr lang="en-GB" dirty="0"/>
+              <a:t> the answers and </a:t>
             </a:r>
             <a:r>
               <a:rPr lang="en-GB" b="1" dirty="0"/>
-              <a:t>customer satisfaction </a:t>
-            </a:r>
-            <a:r>
-              <a:rPr lang="en-GB" dirty="0"/>
-              <a:t>and </a:t>
+              <a:t>exclude</a:t>
+            </a:r>
+            <a:r>
+              <a:rPr lang="en-GB" dirty="0"/>
+              <a:t> from the analysis those that were e.g.:</a:t>
+            </a:r>
+          </a:p>
+          <a:p>
+            <a:pPr lvl="1"/>
+            <a:r>
+              <a:rPr lang="en-GB" dirty="0"/>
+              <a:t>always picking the same alternative (1st, 2nd…)</a:t>
+            </a:r>
+          </a:p>
+          <a:p>
+            <a:pPr lvl="1"/>
+            <a:r>
+              <a:rPr lang="en-GB" dirty="0"/>
+              <a:t>answering too quickly (less than a few seconds per question)</a:t>
+            </a:r>
+          </a:p>
+          <a:p>
+            <a:r>
+              <a:rPr lang="en-GB" dirty="0"/>
+              <a:t>This is an important step because „ unrealistic” answers can significantly </a:t>
             </a:r>
             <a:r>
               <a:rPr lang="en-GB" b="1" dirty="0"/>
-              <a:t>income/profit maximization</a:t>
+              <a:t>decrease the model quality</a:t>
+            </a:r>
+            <a:r>
+              <a:rPr lang="en-GB" dirty="0"/>
+              <a:t>, and sometimes event completely </a:t>
+            </a:r>
+            <a:r>
+              <a:rPr lang="en-GB" b="1" dirty="0"/>
+              <a:t>disable </a:t>
+            </a:r>
+            <a:r>
+              <a:rPr lang="en-GB" dirty="0"/>
+              <a:t>the model creation</a:t>
             </a:r>
           </a:p>
         </p:txBody>
@@ -4446,7 +4598,7 @@
     </p:spTree>
     <p:extLst>
       <p:ext uri="{BB962C8B-B14F-4D97-AF65-F5344CB8AC3E}">
-        <p14:creationId xmlns:p14="http://schemas.microsoft.com/office/powerpoint/2010/main" val="393213080"/>
+        <p14:creationId xmlns:p14="http://schemas.microsoft.com/office/powerpoint/2010/main" val="2507376816"/>
       </p:ext>
     </p:extLst>
   </p:cSld>
@@ -4475,10 +4627,10 @@
       </p:grpSpPr>
       <p:sp>
         <p:nvSpPr>
-          <p:cNvPr id="4" name="Naslov 3">
+          <p:cNvPr id="3" name="Naslov 2">
             <a:extLst>
               <a:ext uri="{FF2B5EF4-FFF2-40B4-BE49-F238E27FC236}">
-                <a16:creationId xmlns:a16="http://schemas.microsoft.com/office/drawing/2014/main" id="{6289B042-185E-424A-AA6A-11CD7343E8E7}"/>
+                <a16:creationId xmlns:a16="http://schemas.microsoft.com/office/drawing/2014/main" id="{2CABC428-AD66-468E-976E-4D8517731473}"/>
               </a:ext>
             </a:extLst>
           </p:cNvPr>
@@ -4495,18 +4647,39 @@
           <a:lstStyle/>
           <a:p>
             <a:r>
-              <a:rPr lang="en-GB" dirty="0"/>
-              <a:t>conclusion</a:t>
-            </a:r>
-          </a:p>
-        </p:txBody>
-      </p:sp>
-      <p:sp>
-        <p:nvSpPr>
-          <p:cNvPr id="5" name="Rezervirano mjesto teksta 4">
+              <a:rPr lang="en-GB" b="1" dirty="0"/>
+              <a:t>Step 8: </a:t>
+            </a:r>
+            <a:r>
+              <a:rPr lang="hr-HR" b="1" dirty="0"/>
+              <a:t>R</a:t>
+            </a:r>
+            <a:r>
+              <a:rPr lang="en-GB" b="1" dirty="0" err="1"/>
+              <a:t>esults</a:t>
+            </a:r>
+            <a:r>
+              <a:rPr lang="en-GB" b="1" dirty="0"/>
+              <a:t> </a:t>
+            </a:r>
+            <a:r>
+              <a:rPr lang="hr-HR" b="1" dirty="0"/>
+              <a:t>A</a:t>
+            </a:r>
+            <a:r>
+              <a:rPr lang="en-GB" b="1" dirty="0" err="1"/>
+              <a:t>nalysis</a:t>
+            </a:r>
+            <a:endParaRPr lang="en-GB" b="1" dirty="0"/>
+          </a:p>
+        </p:txBody>
+      </p:sp>
+      <p:sp>
+        <p:nvSpPr>
+          <p:cNvPr id="6" name="Rezervirano mjesto sadržaja 5">
             <a:extLst>
               <a:ext uri="{FF2B5EF4-FFF2-40B4-BE49-F238E27FC236}">
-                <a16:creationId xmlns:a16="http://schemas.microsoft.com/office/drawing/2014/main" id="{8783C50C-BA90-4C63-A17D-F4807E4FB0ED}"/>
+                <a16:creationId xmlns:a16="http://schemas.microsoft.com/office/drawing/2014/main" id="{086DAD2F-4774-4F7D-B820-2FD9E41F13D4}"/>
               </a:ext>
             </a:extLst>
           </p:cNvPr>
@@ -4514,25 +4687,187 @@
             <a:spLocks noGrp="1"/>
           </p:cNvSpPr>
           <p:nvPr>
-            <p:ph type="body" idx="1"/>
-          </p:nvPr>
-        </p:nvSpPr>
-        <p:spPr/>
-        <p:txBody>
-          <a:bodyPr/>
-          <a:lstStyle/>
-          <a:p>
-            <a:r>
-              <a:rPr lang="en-GB" dirty="0"/>
-              <a:t>Why use the </a:t>
+            <p:ph idx="1"/>
+          </p:nvPr>
+        </p:nvSpPr>
+        <p:spPr/>
+        <p:txBody>
+          <a:bodyPr>
+            <a:normAutofit/>
+          </a:bodyPr>
+          <a:lstStyle/>
+          <a:p>
+            <a:r>
+              <a:rPr lang="en-GB" dirty="0"/>
+              <a:t>Using the given answers, calculate the </a:t>
+            </a:r>
+            <a:r>
+              <a:rPr lang="en-GB" b="1" dirty="0"/>
+              <a:t>products </a:t>
+            </a:r>
+            <a:r>
+              <a:rPr lang="hr-HR" b="1" dirty="0" err="1"/>
+              <a:t>values</a:t>
+            </a:r>
+            <a:r>
+              <a:rPr lang="en-GB" b="1" dirty="0"/>
+              <a:t> </a:t>
+            </a:r>
+            <a:r>
+              <a:rPr lang="en-GB" dirty="0"/>
+              <a:t>and with them calculate e.g.</a:t>
+            </a:r>
+          </a:p>
+          <a:p>
+            <a:pPr lvl="1"/>
+            <a:r>
+              <a:rPr lang="en-GB" b="1" dirty="0"/>
+              <a:t>the best</a:t>
+            </a:r>
+            <a:r>
+              <a:rPr lang="en-GB" dirty="0"/>
+              <a:t> and </a:t>
+            </a:r>
+            <a:r>
+              <a:rPr lang="en-GB" b="1" dirty="0"/>
+              <a:t>the worst</a:t>
+            </a:r>
+            <a:r>
+              <a:rPr lang="en-GB" dirty="0"/>
+              <a:t> product</a:t>
+            </a:r>
+          </a:p>
+          <a:p>
+            <a:pPr lvl="1"/>
+            <a:r>
+              <a:rPr lang="en-GB" dirty="0"/>
+              <a:t>value </a:t>
+            </a:r>
+            <a:r>
+              <a:rPr lang="hr-HR" b="1" dirty="0" err="1"/>
+              <a:t>relationships</a:t>
+            </a:r>
+            <a:r>
+              <a:rPr lang="en-GB" dirty="0"/>
+              <a:t> between the products</a:t>
+            </a:r>
+          </a:p>
+          <a:p>
+            <a:pPr lvl="1"/>
+            <a:r>
+              <a:rPr lang="en-GB" dirty="0"/>
+              <a:t>predicted </a:t>
+            </a:r>
+            <a:r>
+              <a:rPr lang="en-GB" b="1" dirty="0"/>
+              <a:t>sales share</a:t>
+            </a:r>
+            <a:r>
+              <a:rPr lang="hr-HR" b="1" dirty="0"/>
+              <a:t>s</a:t>
+            </a:r>
+            <a:r>
+              <a:rPr lang="en-GB" dirty="0"/>
+              <a:t> for </a:t>
+            </a:r>
+            <a:r>
+              <a:rPr lang="hr-HR" dirty="0"/>
+              <a:t>some </a:t>
             </a:r>
             <a:r>
               <a:rPr lang="hr-HR" dirty="0" err="1"/>
-              <a:t>MaxDiff</a:t>
-            </a:r>
-            <a:r>
-              <a:rPr lang="en-GB" dirty="0"/>
-              <a:t> analysis</a:t>
+              <a:t>chosen</a:t>
+            </a:r>
+            <a:r>
+              <a:rPr lang="hr-HR" dirty="0"/>
+              <a:t> </a:t>
+            </a:r>
+            <a:r>
+              <a:rPr lang="hr-HR" dirty="0" err="1"/>
+              <a:t>group</a:t>
+            </a:r>
+            <a:r>
+              <a:rPr lang="hr-HR" dirty="0"/>
+              <a:t> </a:t>
+            </a:r>
+            <a:r>
+              <a:rPr lang="hr-HR" dirty="0" err="1"/>
+              <a:t>of</a:t>
+            </a:r>
+            <a:r>
+              <a:rPr lang="hr-HR" dirty="0"/>
+              <a:t> </a:t>
+            </a:r>
+            <a:r>
+              <a:rPr lang="hr-HR" dirty="0" err="1"/>
+              <a:t>products</a:t>
+            </a:r>
+            <a:endParaRPr lang="en-GB" dirty="0"/>
+          </a:p>
+          <a:p>
+            <a:pPr lvl="1"/>
+            <a:r>
+              <a:rPr lang="hr-HR" dirty="0" err="1"/>
+              <a:t>find</a:t>
+            </a:r>
+            <a:r>
+              <a:rPr lang="hr-HR" dirty="0"/>
+              <a:t> </a:t>
+            </a:r>
+            <a:r>
+              <a:rPr lang="hr-HR" dirty="0" err="1"/>
+              <a:t>the</a:t>
+            </a:r>
+            <a:r>
+              <a:rPr lang="hr-HR" dirty="0"/>
+              <a:t> </a:t>
+            </a:r>
+            <a:r>
+              <a:rPr lang="hr-HR" dirty="0" err="1"/>
+              <a:t>best</a:t>
+            </a:r>
+            <a:r>
+              <a:rPr lang="hr-HR" dirty="0"/>
+              <a:t> </a:t>
+            </a:r>
+            <a:r>
+              <a:rPr lang="hr-HR" dirty="0" err="1"/>
+              <a:t>combination</a:t>
+            </a:r>
+            <a:r>
+              <a:rPr lang="hr-HR" dirty="0"/>
+              <a:t> </a:t>
+            </a:r>
+            <a:r>
+              <a:rPr lang="hr-HR" dirty="0" err="1"/>
+              <a:t>of</a:t>
+            </a:r>
+            <a:r>
+              <a:rPr lang="hr-HR" dirty="0"/>
+              <a:t> </a:t>
+            </a:r>
+            <a:r>
+              <a:rPr lang="hr-HR" dirty="0" err="1"/>
+              <a:t>products</a:t>
+            </a:r>
+            <a:r>
+              <a:rPr lang="hr-HR" dirty="0"/>
+              <a:t> (</a:t>
+            </a:r>
+            <a:r>
+              <a:rPr lang="hr-HR" b="1" dirty="0"/>
+              <a:t>TURF</a:t>
+            </a:r>
+            <a:r>
+              <a:rPr lang="hr-HR" dirty="0"/>
+              <a:t>)</a:t>
+            </a:r>
+            <a:endParaRPr lang="en-GB" dirty="0"/>
+          </a:p>
+          <a:p>
+            <a:r>
+              <a:rPr lang="en-GB" b="1" dirty="0"/>
+              <a:t>Respondents segmentation</a:t>
             </a:r>
           </a:p>
         </p:txBody>
@@ -4540,7 +4875,7 @@
     </p:spTree>
     <p:extLst>
       <p:ext uri="{BB962C8B-B14F-4D97-AF65-F5344CB8AC3E}">
-        <p14:creationId xmlns:p14="http://schemas.microsoft.com/office/powerpoint/2010/main" val="3148688563"/>
+        <p14:creationId xmlns:p14="http://schemas.microsoft.com/office/powerpoint/2010/main" val="2542513795"/>
       </p:ext>
     </p:extLst>
   </p:cSld>
@@ -4619,8 +4954,29 @@
           <a:p>
             <a:r>
               <a:rPr lang="en-GB" dirty="0"/>
-              <a:t>Products and buying decisions</a:t>
-            </a:r>
+              <a:t>Products and </a:t>
+            </a:r>
+            <a:r>
+              <a:rPr lang="hr-HR" dirty="0"/>
+              <a:t>B</a:t>
+            </a:r>
+            <a:r>
+              <a:rPr lang="en-GB" dirty="0" err="1"/>
+              <a:t>uying</a:t>
+            </a:r>
+            <a:r>
+              <a:rPr lang="en-GB" dirty="0"/>
+              <a:t> </a:t>
+            </a:r>
+            <a:r>
+              <a:rPr lang="hr-HR" dirty="0"/>
+              <a:t>D</a:t>
+            </a:r>
+            <a:r>
+              <a:rPr lang="en-GB" dirty="0" err="1"/>
+              <a:t>ecisions</a:t>
+            </a:r>
+            <a:endParaRPr lang="en-GB" dirty="0"/>
           </a:p>
         </p:txBody>
       </p:sp>
@@ -4677,16 +5033,25 @@
           <a:p>
             <a:r>
               <a:rPr lang="en-GB" b="1" dirty="0"/>
-              <a:t>Why use the </a:t>
-            </a:r>
-            <a:r>
-              <a:rPr lang="hr-HR" b="1" dirty="0" err="1"/>
-              <a:t>MaxDiff</a:t>
+              <a:t>Step 9: </a:t>
+            </a:r>
+            <a:r>
+              <a:rPr lang="hr-HR" b="1" dirty="0"/>
+              <a:t>U</a:t>
             </a:r>
             <a:r>
               <a:rPr lang="en-GB" b="1" dirty="0"/>
-              <a:t> analysis</a:t>
-            </a:r>
+              <a:t>sing the </a:t>
+            </a:r>
+            <a:r>
+              <a:rPr lang="hr-HR" b="1" dirty="0"/>
+              <a:t>R</a:t>
+            </a:r>
+            <a:r>
+              <a:rPr lang="en-GB" b="1" dirty="0" err="1"/>
+              <a:t>esults</a:t>
+            </a:r>
+            <a:endParaRPr lang="en-GB" b="1" dirty="0"/>
           </a:p>
         </p:txBody>
       </p:sp>
@@ -4709,41 +5074,47 @@
         <p:spPr/>
         <p:txBody>
           <a:bodyPr>
-            <a:normAutofit/>
+            <a:normAutofit lnSpcReduction="10000"/>
           </a:bodyPr>
           <a:lstStyle/>
           <a:p>
+            <a:r>
+              <a:rPr lang="en-GB" dirty="0"/>
+              <a:t>Using the results analysis, make the </a:t>
+            </a:r>
+            <a:r>
+              <a:rPr lang="en-GB" b="1" dirty="0"/>
+              <a:t>business decisions </a:t>
+            </a:r>
+            <a:r>
+              <a:rPr lang="en-GB" dirty="0"/>
+              <a:t>about new products, changing the existing or planned products, customer segmentation, marketing and sales adaptation…</a:t>
+            </a:r>
+          </a:p>
+          <a:p>
+            <a:r>
+              <a:rPr lang="en-GB" dirty="0"/>
+              <a:t>With the </a:t>
+            </a:r>
             <a:r>
               <a:rPr lang="en-GB" dirty="0" err="1"/>
               <a:t>MaxDiff</a:t>
             </a:r>
             <a:r>
               <a:rPr lang="en-GB" dirty="0"/>
-              <a:t> analysis is based on a reliably good model of making buying decisions (random utility model, used for more than 40 years in a few variants)</a:t>
-            </a:r>
-          </a:p>
-          <a:p>
-            <a:r>
-              <a:rPr lang="en-GB" dirty="0"/>
-              <a:t>Answers are given by the buyers</a:t>
-            </a:r>
-          </a:p>
-          <a:p>
-            <a:r>
-              <a:rPr lang="en-GB" dirty="0"/>
-              <a:t>A very good simulation of a real purchase</a:t>
-            </a:r>
-          </a:p>
-          <a:p>
-            <a:r>
-              <a:rPr lang="en-GB" dirty="0"/>
-              <a:t>Relatively simple to implement</a:t>
-            </a:r>
-          </a:p>
-          <a:p>
+              <a:t> methodology, business decisions will be aligned with the customers valuations and this will ensure the </a:t>
+            </a:r>
             <a:r>
               <a:rPr lang="en-GB" b="1" dirty="0"/>
-              <a:t>Improves business decisions</a:t>
+              <a:t>customer satisfaction </a:t>
+            </a:r>
+            <a:r>
+              <a:rPr lang="en-GB" dirty="0"/>
+              <a:t>and </a:t>
+            </a:r>
+            <a:r>
+              <a:rPr lang="en-GB" b="1" dirty="0"/>
+              <a:t>income/profit maximization</a:t>
             </a:r>
           </a:p>
         </p:txBody>
@@ -4751,7 +5122,7 @@
     </p:spTree>
     <p:extLst>
       <p:ext uri="{BB962C8B-B14F-4D97-AF65-F5344CB8AC3E}">
-        <p14:creationId xmlns:p14="http://schemas.microsoft.com/office/powerpoint/2010/main" val="2001081672"/>
+        <p14:creationId xmlns:p14="http://schemas.microsoft.com/office/powerpoint/2010/main" val="393213080"/>
       </p:ext>
     </p:extLst>
   </p:cSld>
@@ -4780,6 +5151,373 @@
       </p:grpSpPr>
       <p:sp>
         <p:nvSpPr>
+          <p:cNvPr id="4" name="Naslov 3">
+            <a:extLst>
+              <a:ext uri="{FF2B5EF4-FFF2-40B4-BE49-F238E27FC236}">
+                <a16:creationId xmlns:a16="http://schemas.microsoft.com/office/drawing/2014/main" id="{6289B042-185E-424A-AA6A-11CD7343E8E7}"/>
+              </a:ext>
+            </a:extLst>
+          </p:cNvPr>
+          <p:cNvSpPr>
+            <a:spLocks noGrp="1"/>
+          </p:cNvSpPr>
+          <p:nvPr>
+            <p:ph type="title"/>
+          </p:nvPr>
+        </p:nvSpPr>
+        <p:spPr/>
+        <p:txBody>
+          <a:bodyPr/>
+          <a:lstStyle/>
+          <a:p>
+            <a:r>
+              <a:rPr lang="en-GB" dirty="0"/>
+              <a:t>conclusion</a:t>
+            </a:r>
+          </a:p>
+        </p:txBody>
+      </p:sp>
+      <p:sp>
+        <p:nvSpPr>
+          <p:cNvPr id="5" name="Rezervirano mjesto teksta 4">
+            <a:extLst>
+              <a:ext uri="{FF2B5EF4-FFF2-40B4-BE49-F238E27FC236}">
+                <a16:creationId xmlns:a16="http://schemas.microsoft.com/office/drawing/2014/main" id="{8783C50C-BA90-4C63-A17D-F4807E4FB0ED}"/>
+              </a:ext>
+            </a:extLst>
+          </p:cNvPr>
+          <p:cNvSpPr>
+            <a:spLocks noGrp="1"/>
+          </p:cNvSpPr>
+          <p:nvPr>
+            <p:ph type="body" idx="1"/>
+          </p:nvPr>
+        </p:nvSpPr>
+        <p:spPr/>
+        <p:txBody>
+          <a:bodyPr/>
+          <a:lstStyle/>
+          <a:p>
+            <a:r>
+              <a:rPr lang="en-GB" dirty="0"/>
+              <a:t>Why </a:t>
+            </a:r>
+            <a:r>
+              <a:rPr lang="hr-HR" dirty="0"/>
+              <a:t>U</a:t>
+            </a:r>
+            <a:r>
+              <a:rPr lang="en-GB" dirty="0"/>
+              <a:t>se the </a:t>
+            </a:r>
+            <a:r>
+              <a:rPr lang="hr-HR" dirty="0" err="1"/>
+              <a:t>MaxDiff</a:t>
+            </a:r>
+            <a:r>
+              <a:rPr lang="en-GB" dirty="0"/>
+              <a:t> </a:t>
+            </a:r>
+            <a:r>
+              <a:rPr lang="hr-HR" dirty="0"/>
+              <a:t>A</a:t>
+            </a:r>
+            <a:r>
+              <a:rPr lang="en-GB" dirty="0" err="1"/>
+              <a:t>nalysis</a:t>
+            </a:r>
+            <a:endParaRPr lang="en-GB" dirty="0"/>
+          </a:p>
+        </p:txBody>
+      </p:sp>
+    </p:spTree>
+    <p:extLst>
+      <p:ext uri="{BB962C8B-B14F-4D97-AF65-F5344CB8AC3E}">
+        <p14:creationId xmlns:p14="http://schemas.microsoft.com/office/powerpoint/2010/main" val="3148688563"/>
+      </p:ext>
+    </p:extLst>
+  </p:cSld>
+  <p:clrMapOvr>
+    <a:masterClrMapping/>
+  </p:clrMapOvr>
+</p:sld>
+</file>
+
+<file path=ppt/slides/slide22.xml><?xml version="1.0" encoding="utf-8"?>
+<p:sld xmlns:a="http://schemas.openxmlformats.org/drawingml/2006/main" xmlns:r="http://schemas.openxmlformats.org/officeDocument/2006/relationships" xmlns:p="http://schemas.openxmlformats.org/presentationml/2006/main">
+  <p:cSld>
+    <p:spTree>
+      <p:nvGrpSpPr>
+        <p:cNvPr id="1" name=""/>
+        <p:cNvGrpSpPr/>
+        <p:nvPr/>
+      </p:nvGrpSpPr>
+      <p:grpSpPr>
+        <a:xfrm>
+          <a:off x="0" y="0"/>
+          <a:ext cx="0" cy="0"/>
+          <a:chOff x="0" y="0"/>
+          <a:chExt cx="0" cy="0"/>
+        </a:xfrm>
+      </p:grpSpPr>
+      <p:sp>
+        <p:nvSpPr>
+          <p:cNvPr id="3" name="Naslov 2">
+            <a:extLst>
+              <a:ext uri="{FF2B5EF4-FFF2-40B4-BE49-F238E27FC236}">
+                <a16:creationId xmlns:a16="http://schemas.microsoft.com/office/drawing/2014/main" id="{2CABC428-AD66-468E-976E-4D8517731473}"/>
+              </a:ext>
+            </a:extLst>
+          </p:cNvPr>
+          <p:cNvSpPr>
+            <a:spLocks noGrp="1"/>
+          </p:cNvSpPr>
+          <p:nvPr>
+            <p:ph type="title"/>
+          </p:nvPr>
+        </p:nvSpPr>
+        <p:spPr/>
+        <p:txBody>
+          <a:bodyPr/>
+          <a:lstStyle/>
+          <a:p>
+            <a:r>
+              <a:rPr lang="en-GB" b="1" dirty="0"/>
+              <a:t>Why </a:t>
+            </a:r>
+            <a:r>
+              <a:rPr lang="hr-HR" b="1" dirty="0"/>
+              <a:t>U</a:t>
+            </a:r>
+            <a:r>
+              <a:rPr lang="en-GB" b="1" dirty="0"/>
+              <a:t>se the </a:t>
+            </a:r>
+            <a:r>
+              <a:rPr lang="hr-HR" b="1" dirty="0" err="1"/>
+              <a:t>MaxDiff</a:t>
+            </a:r>
+            <a:r>
+              <a:rPr lang="en-GB" b="1" dirty="0"/>
+              <a:t> </a:t>
+            </a:r>
+            <a:r>
+              <a:rPr lang="hr-HR" b="1" dirty="0"/>
+              <a:t>A</a:t>
+            </a:r>
+            <a:r>
+              <a:rPr lang="en-GB" b="1" dirty="0" err="1"/>
+              <a:t>nalysis</a:t>
+            </a:r>
+            <a:endParaRPr lang="en-GB" b="1" dirty="0"/>
+          </a:p>
+        </p:txBody>
+      </p:sp>
+      <p:sp>
+        <p:nvSpPr>
+          <p:cNvPr id="6" name="Rezervirano mjesto sadržaja 5">
+            <a:extLst>
+              <a:ext uri="{FF2B5EF4-FFF2-40B4-BE49-F238E27FC236}">
+                <a16:creationId xmlns:a16="http://schemas.microsoft.com/office/drawing/2014/main" id="{086DAD2F-4774-4F7D-B820-2FD9E41F13D4}"/>
+              </a:ext>
+            </a:extLst>
+          </p:cNvPr>
+          <p:cNvSpPr>
+            <a:spLocks noGrp="1"/>
+          </p:cNvSpPr>
+          <p:nvPr>
+            <p:ph idx="1"/>
+          </p:nvPr>
+        </p:nvSpPr>
+        <p:spPr/>
+        <p:txBody>
+          <a:bodyPr>
+            <a:normAutofit lnSpcReduction="10000"/>
+          </a:bodyPr>
+          <a:lstStyle/>
+          <a:p>
+            <a:r>
+              <a:rPr lang="en-GB" dirty="0"/>
+              <a:t>Based on a reliably good model of making buying decisions (random utility model, used for more than 40 years in a few variants)</a:t>
+            </a:r>
+          </a:p>
+          <a:p>
+            <a:r>
+              <a:rPr lang="en-GB" dirty="0"/>
+              <a:t>A very good simulation of the real purchase</a:t>
+            </a:r>
+          </a:p>
+          <a:p>
+            <a:r>
+              <a:rPr lang="en-GB" dirty="0"/>
+              <a:t>Answers given by the buyers</a:t>
+            </a:r>
+          </a:p>
+          <a:p>
+            <a:r>
+              <a:rPr lang="en-GB" dirty="0"/>
+              <a:t>Respondents find it easier to choose the best and the worst option instead of rating 5 or 6 (e.g. on Likert scales), thus giving more precise answers</a:t>
+            </a:r>
+          </a:p>
+        </p:txBody>
+      </p:sp>
+    </p:spTree>
+    <p:extLst>
+      <p:ext uri="{BB962C8B-B14F-4D97-AF65-F5344CB8AC3E}">
+        <p14:creationId xmlns:p14="http://schemas.microsoft.com/office/powerpoint/2010/main" val="2001081672"/>
+      </p:ext>
+    </p:extLst>
+  </p:cSld>
+  <p:clrMapOvr>
+    <a:masterClrMapping/>
+  </p:clrMapOvr>
+</p:sld>
+</file>
+
+<file path=ppt/slides/slide23.xml><?xml version="1.0" encoding="utf-8"?>
+<p:sld xmlns:a="http://schemas.openxmlformats.org/drawingml/2006/main" xmlns:r="http://schemas.openxmlformats.org/officeDocument/2006/relationships" xmlns:p="http://schemas.openxmlformats.org/presentationml/2006/main">
+  <p:cSld>
+    <p:spTree>
+      <p:nvGrpSpPr>
+        <p:cNvPr id="1" name=""/>
+        <p:cNvGrpSpPr/>
+        <p:nvPr/>
+      </p:nvGrpSpPr>
+      <p:grpSpPr>
+        <a:xfrm>
+          <a:off x="0" y="0"/>
+          <a:ext cx="0" cy="0"/>
+          <a:chOff x="0" y="0"/>
+          <a:chExt cx="0" cy="0"/>
+        </a:xfrm>
+      </p:grpSpPr>
+      <p:sp>
+        <p:nvSpPr>
+          <p:cNvPr id="3" name="Naslov 2">
+            <a:extLst>
+              <a:ext uri="{FF2B5EF4-FFF2-40B4-BE49-F238E27FC236}">
+                <a16:creationId xmlns:a16="http://schemas.microsoft.com/office/drawing/2014/main" id="{2CABC428-AD66-468E-976E-4D8517731473}"/>
+              </a:ext>
+            </a:extLst>
+          </p:cNvPr>
+          <p:cNvSpPr>
+            <a:spLocks noGrp="1"/>
+          </p:cNvSpPr>
+          <p:nvPr>
+            <p:ph type="title"/>
+          </p:nvPr>
+        </p:nvSpPr>
+        <p:spPr/>
+        <p:txBody>
+          <a:bodyPr/>
+          <a:lstStyle/>
+          <a:p>
+            <a:r>
+              <a:rPr lang="en-GB" b="1" dirty="0"/>
+              <a:t>Why </a:t>
+            </a:r>
+            <a:r>
+              <a:rPr lang="hr-HR" b="1" dirty="0"/>
+              <a:t>U</a:t>
+            </a:r>
+            <a:r>
+              <a:rPr lang="en-GB" b="1" dirty="0"/>
+              <a:t>se the </a:t>
+            </a:r>
+            <a:r>
+              <a:rPr lang="hr-HR" b="1" dirty="0" err="1"/>
+              <a:t>MaxDiff</a:t>
+            </a:r>
+            <a:r>
+              <a:rPr lang="en-GB" b="1" dirty="0"/>
+              <a:t> </a:t>
+            </a:r>
+            <a:r>
+              <a:rPr lang="hr-HR" b="1" dirty="0"/>
+              <a:t>A</a:t>
+            </a:r>
+            <a:r>
+              <a:rPr lang="en-GB" b="1" dirty="0" err="1"/>
+              <a:t>nalysis</a:t>
+            </a:r>
+            <a:endParaRPr lang="en-GB" b="1" dirty="0"/>
+          </a:p>
+        </p:txBody>
+      </p:sp>
+      <p:sp>
+        <p:nvSpPr>
+          <p:cNvPr id="6" name="Rezervirano mjesto sadržaja 5">
+            <a:extLst>
+              <a:ext uri="{FF2B5EF4-FFF2-40B4-BE49-F238E27FC236}">
+                <a16:creationId xmlns:a16="http://schemas.microsoft.com/office/drawing/2014/main" id="{086DAD2F-4774-4F7D-B820-2FD9E41F13D4}"/>
+              </a:ext>
+            </a:extLst>
+          </p:cNvPr>
+          <p:cNvSpPr>
+            <a:spLocks noGrp="1"/>
+          </p:cNvSpPr>
+          <p:nvPr>
+            <p:ph idx="1"/>
+          </p:nvPr>
+        </p:nvSpPr>
+        <p:spPr/>
+        <p:txBody>
+          <a:bodyPr>
+            <a:normAutofit/>
+          </a:bodyPr>
+          <a:lstStyle/>
+          <a:p>
+            <a:r>
+              <a:rPr lang="en-GB" dirty="0"/>
+              <a:t>More precise answers give better models and estimates of the future behaviour</a:t>
+            </a:r>
+          </a:p>
+          <a:p>
+            <a:r>
+              <a:rPr lang="en-GB" dirty="0"/>
+              <a:t>Gives relative ratios between the products, not just the overall ranking</a:t>
+            </a:r>
+          </a:p>
+          <a:p>
+            <a:r>
+              <a:rPr lang="en-GB" dirty="0"/>
+              <a:t>Positions products compared to the key point „buy - not buy”, „want – don’t want”, „like – don’t like”</a:t>
+            </a:r>
+          </a:p>
+        </p:txBody>
+      </p:sp>
+    </p:spTree>
+    <p:extLst>
+      <p:ext uri="{BB962C8B-B14F-4D97-AF65-F5344CB8AC3E}">
+        <p14:creationId xmlns:p14="http://schemas.microsoft.com/office/powerpoint/2010/main" val="3049339136"/>
+      </p:ext>
+    </p:extLst>
+  </p:cSld>
+  <p:clrMapOvr>
+    <a:masterClrMapping/>
+  </p:clrMapOvr>
+</p:sld>
+</file>
+
+<file path=ppt/slides/slide24.xml><?xml version="1.0" encoding="utf-8"?>
+<p:sld xmlns:a="http://schemas.openxmlformats.org/drawingml/2006/main" xmlns:r="http://schemas.openxmlformats.org/officeDocument/2006/relationships" xmlns:p="http://schemas.openxmlformats.org/presentationml/2006/main">
+  <p:cSld>
+    <p:spTree>
+      <p:nvGrpSpPr>
+        <p:cNvPr id="1" name=""/>
+        <p:cNvGrpSpPr/>
+        <p:nvPr/>
+      </p:nvGrpSpPr>
+      <p:grpSpPr>
+        <a:xfrm>
+          <a:off x="0" y="0"/>
+          <a:ext cx="0" cy="0"/>
+          <a:chOff x="0" y="0"/>
+          <a:chExt cx="0" cy="0"/>
+        </a:xfrm>
+      </p:grpSpPr>
+      <p:sp>
+        <p:nvSpPr>
           <p:cNvPr id="2" name="Content Placeholder 1"/>
           <p:cNvSpPr>
             <a:spLocks noGrp="1"/>
@@ -4849,8 +5587,17 @@
           <a:p>
             <a:r>
               <a:rPr lang="en-GB" b="1" dirty="0"/>
-              <a:t>Contact and information</a:t>
-            </a:r>
+              <a:t>Contact and </a:t>
+            </a:r>
+            <a:r>
+              <a:rPr lang="hr-HR" b="1" dirty="0"/>
+              <a:t>I</a:t>
+            </a:r>
+            <a:r>
+              <a:rPr lang="en-GB" b="1" dirty="0" err="1"/>
+              <a:t>nformation</a:t>
+            </a:r>
+            <a:endParaRPr lang="en-GB" b="1" dirty="0"/>
           </a:p>
         </p:txBody>
       </p:sp>
@@ -4904,7 +5651,7 @@
           <a:p>
             <a:r>
               <a:rPr lang="en-GB" b="1" dirty="0"/>
-              <a:t>How do people buy products?</a:t>
+              <a:t>People Give Value to Products</a:t>
             </a:r>
           </a:p>
         </p:txBody>
@@ -4934,93 +5681,160 @@
           <a:p>
             <a:r>
               <a:rPr lang="en-GB" dirty="0"/>
-              <a:t>People buy products by „</a:t>
+              <a:t>People </a:t>
+            </a:r>
+            <a:r>
+              <a:rPr lang="hr-HR" b="1" dirty="0" err="1"/>
+              <a:t>compare</a:t>
+            </a:r>
+            <a:r>
+              <a:rPr lang="hr-HR" dirty="0"/>
+              <a:t> and </a:t>
+            </a:r>
+            <a:r>
+              <a:rPr lang="en-GB" dirty="0"/>
+              <a:t>„</a:t>
             </a:r>
             <a:r>
               <a:rPr lang="en-GB" b="1" dirty="0"/>
-              <a:t>weighing</a:t>
-            </a:r>
-            <a:r>
-              <a:rPr lang="en-GB" dirty="0"/>
-              <a:t>” each product (</a:t>
-            </a:r>
-            <a:r>
-              <a:rPr lang="en-GB" i="1" dirty="0"/>
-              <a:t>its features</a:t>
-            </a:r>
-            <a:r>
-              <a:rPr lang="en-GB" dirty="0"/>
-              <a:t>) and „</a:t>
+              <a:t>weigh</a:t>
+            </a:r>
+            <a:r>
+              <a:rPr lang="en-GB" dirty="0"/>
+              <a:t>” </a:t>
+            </a:r>
+            <a:r>
+              <a:rPr lang="hr-HR" dirty="0" err="1"/>
+              <a:t>different</a:t>
+            </a:r>
+            <a:r>
+              <a:rPr lang="hr-HR" dirty="0"/>
+              <a:t> </a:t>
+            </a:r>
+            <a:r>
+              <a:rPr lang="hr-HR" dirty="0" err="1"/>
+              <a:t>aspects</a:t>
+            </a:r>
+            <a:r>
+              <a:rPr lang="hr-HR" dirty="0"/>
+              <a:t> </a:t>
+            </a:r>
+            <a:r>
+              <a:rPr lang="hr-HR" dirty="0" err="1"/>
+              <a:t>of</a:t>
+            </a:r>
+            <a:r>
+              <a:rPr lang="hr-HR" dirty="0"/>
+              <a:t> </a:t>
+            </a:r>
+            <a:r>
+              <a:rPr lang="hr-HR" dirty="0" err="1"/>
+              <a:t>each</a:t>
+            </a:r>
+            <a:r>
+              <a:rPr lang="hr-HR" dirty="0"/>
+              <a:t> </a:t>
+            </a:r>
+            <a:r>
+              <a:rPr lang="en-GB" dirty="0"/>
+              <a:t>product and „</a:t>
             </a:r>
             <a:r>
               <a:rPr lang="en-GB" b="1" dirty="0"/>
-              <a:t>calculating</a:t>
+              <a:t>calculate</a:t>
             </a:r>
             <a:r>
               <a:rPr lang="en-GB" dirty="0"/>
               <a:t>” </a:t>
             </a:r>
             <a:r>
+              <a:rPr lang="hr-HR" dirty="0" err="1"/>
+              <a:t>product</a:t>
+            </a:r>
+            <a:r>
+              <a:rPr lang="hr-HR" dirty="0"/>
+              <a:t>’</a:t>
+            </a:r>
+            <a:r>
+              <a:rPr lang="en-GB" dirty="0"/>
+              <a:t>s </a:t>
+            </a:r>
+            <a:r>
               <a:rPr lang="en-GB" b="1" dirty="0"/>
-              <a:t>total benefit </a:t>
+              <a:t>total value </a:t>
             </a:r>
             <a:r>
               <a:rPr lang="en-GB" dirty="0"/>
               <a:t>(</a:t>
             </a:r>
             <a:r>
-              <a:rPr lang="en-GB" b="1" dirty="0"/>
+              <a:rPr lang="hr-HR" dirty="0"/>
+              <a:t>„</a:t>
+            </a:r>
+            <a:r>
+              <a:rPr lang="en-GB" dirty="0"/>
               <a:t>utility</a:t>
             </a:r>
             <a:r>
-              <a:rPr lang="en-GB" dirty="0"/>
-              <a:t>) for them</a:t>
-            </a:r>
-          </a:p>
-          <a:p>
-            <a:r>
-              <a:rPr lang="en-GB" dirty="0"/>
-              <a:t>Car: I prefer cars with </a:t>
-            </a:r>
-            <a:r>
-              <a:rPr lang="en-GB" i="1" dirty="0"/>
-              <a:t>known brands</a:t>
-            </a:r>
-          </a:p>
-          <a:p>
-            <a:r>
-              <a:rPr lang="en-GB" dirty="0"/>
-              <a:t>Pizza: I prefer </a:t>
-            </a:r>
-            <a:r>
-              <a:rPr lang="en-GB" i="1" dirty="0"/>
-              <a:t>spicy</a:t>
-            </a:r>
-            <a:r>
-              <a:rPr lang="en-GB" dirty="0"/>
-              <a:t> pizzas</a:t>
-            </a:r>
-          </a:p>
-          <a:p>
-            <a:r>
-              <a:rPr lang="en-GB" dirty="0"/>
-              <a:t>Jeans: I prefer </a:t>
-            </a:r>
-            <a:r>
-              <a:rPr lang="en-GB" i="1" dirty="0"/>
-              <a:t>blue regular fit</a:t>
-            </a:r>
-            <a:r>
-              <a:rPr lang="en-GB" dirty="0"/>
-              <a:t> jeans</a:t>
-            </a:r>
-          </a:p>
-        </p:txBody>
-      </p:sp>
+              <a:rPr lang="hr-HR" dirty="0"/>
+              <a:t>”)</a:t>
+            </a:r>
+            <a:r>
+              <a:rPr lang="hr-HR" b="1" dirty="0"/>
+              <a:t> </a:t>
+            </a:r>
+            <a:r>
+              <a:rPr lang="hr-HR" dirty="0"/>
+              <a:t>for </a:t>
+            </a:r>
+            <a:r>
+              <a:rPr lang="hr-HR" dirty="0" err="1"/>
+              <a:t>them</a:t>
+            </a:r>
+            <a:endParaRPr lang="en-GB" dirty="0"/>
+          </a:p>
+        </p:txBody>
+      </p:sp>
+      <p:pic>
+        <p:nvPicPr>
+          <p:cNvPr id="5" name="Slika 4">
+            <a:extLst>
+              <a:ext uri="{FF2B5EF4-FFF2-40B4-BE49-F238E27FC236}">
+                <a16:creationId xmlns:a16="http://schemas.microsoft.com/office/drawing/2014/main" id="{20D4631B-0B07-4C32-A2E9-B543DD7ACA5A}"/>
+              </a:ext>
+            </a:extLst>
+          </p:cNvPr>
+          <p:cNvPicPr>
+            <a:picLocks noChangeAspect="1"/>
+          </p:cNvPicPr>
+          <p:nvPr/>
+        </p:nvPicPr>
+        <p:blipFill>
+          <a:blip r:embed="rId2">
+            <a:extLst>
+              <a:ext uri="{28A0092B-C50C-407E-A947-70E740481C1C}">
+                <a14:useLocalDpi xmlns:a14="http://schemas.microsoft.com/office/drawing/2010/main" val="0"/>
+              </a:ext>
+            </a:extLst>
+          </a:blip>
+          <a:stretch>
+            <a:fillRect/>
+          </a:stretch>
+        </p:blipFill>
+        <p:spPr>
+          <a:xfrm>
+            <a:off x="2555776" y="3140968"/>
+            <a:ext cx="5616624" cy="3344307"/>
+          </a:xfrm>
+          <a:prstGeom prst="rect">
+            <a:avLst/>
+          </a:prstGeom>
+        </p:spPr>
+      </p:pic>
     </p:spTree>
     <p:extLst>
       <p:ext uri="{BB962C8B-B14F-4D97-AF65-F5344CB8AC3E}">
-        <p14:creationId xmlns:p14="http://schemas.microsoft.com/office/powerpoint/2010/main" val="1556041914"/>
+        <p14:creationId xmlns:p14="http://schemas.microsoft.com/office/powerpoint/2010/main" val="1995832127"/>
       </p:ext>
     </p:extLst>
   </p:cSld>
@@ -5070,7 +5884,7 @@
           <a:p>
             <a:r>
               <a:rPr lang="en-GB" b="1" dirty="0"/>
-              <a:t>Buying decision</a:t>
+              <a:t>People Make Buying Decision</a:t>
             </a:r>
           </a:p>
         </p:txBody>
@@ -5093,7 +5907,9 @@
         </p:nvSpPr>
         <p:spPr/>
         <p:txBody>
-          <a:bodyPr/>
+          <a:bodyPr>
+            <a:normAutofit lnSpcReduction="10000"/>
+          </a:bodyPr>
           <a:lstStyle/>
           <a:p>
             <a:r>
@@ -5110,17 +5926,30 @@
             </a:r>
             <a:r>
               <a:rPr lang="en-GB" b="1" dirty="0"/>
-              <a:t>highest benefit</a:t>
-            </a:r>
-            <a:r>
-              <a:rPr lang="en-GB" dirty="0"/>
-              <a:t> (utility) for them</a:t>
-            </a:r>
-          </a:p>
-          <a:p>
-            <a:r>
-              <a:rPr lang="en-GB" dirty="0"/>
-              <a:t>Buying decision is not </a:t>
+              <a:t>highest value </a:t>
+            </a:r>
+            <a:r>
+              <a:rPr lang="en-GB" dirty="0"/>
+              <a:t>(utility) for them</a:t>
+            </a:r>
+            <a:endParaRPr lang="hr-HR" dirty="0"/>
+          </a:p>
+          <a:p>
+            <a:endParaRPr lang="hr-HR" dirty="0"/>
+          </a:p>
+          <a:p>
+            <a:pPr marL="0" indent="0">
+              <a:buNone/>
+            </a:pPr>
+            <a:endParaRPr lang="en-GB" dirty="0"/>
+          </a:p>
+          <a:p>
+            <a:endParaRPr lang="hr-HR" dirty="0"/>
+          </a:p>
+          <a:p>
+            <a:r>
+              <a:rPr lang="en-GB" dirty="0"/>
+              <a:t>Buying decision is probabilistic and not </a:t>
             </a:r>
             <a:r>
               <a:rPr lang="en-GB" b="1" dirty="0"/>
@@ -5128,15 +5957,51 @@
             </a:r>
             <a:r>
               <a:rPr lang="en-GB" dirty="0"/>
-              <a:t>because there are always additional influences not explained by the attributes defined – that is why the decision is probabilistic, but based on the relations between the attribute values</a:t>
-            </a:r>
-          </a:p>
-        </p:txBody>
-      </p:sp>
+              <a:t>because there are always additional influences not explained by the product attributes and the relations between them</a:t>
+            </a:r>
+          </a:p>
+        </p:txBody>
+      </p:sp>
+      <p:pic>
+        <p:nvPicPr>
+          <p:cNvPr id="4" name="Slika 3">
+            <a:extLst>
+              <a:ext uri="{FF2B5EF4-FFF2-40B4-BE49-F238E27FC236}">
+                <a16:creationId xmlns:a16="http://schemas.microsoft.com/office/drawing/2014/main" id="{B9CB8F87-C5F6-404D-8196-EEE984E9572B}"/>
+              </a:ext>
+            </a:extLst>
+          </p:cNvPr>
+          <p:cNvPicPr>
+            <a:picLocks noChangeAspect="1"/>
+          </p:cNvPicPr>
+          <p:nvPr/>
+        </p:nvPicPr>
+        <p:blipFill>
+          <a:blip r:embed="rId2">
+            <a:extLst>
+              <a:ext uri="{28A0092B-C50C-407E-A947-70E740481C1C}">
+                <a14:useLocalDpi xmlns:a14="http://schemas.microsoft.com/office/drawing/2010/main" val="0"/>
+              </a:ext>
+            </a:extLst>
+          </a:blip>
+          <a:stretch>
+            <a:fillRect/>
+          </a:stretch>
+        </p:blipFill>
+        <p:spPr>
+          <a:xfrm>
+            <a:off x="2915816" y="2636912"/>
+            <a:ext cx="3312368" cy="1521781"/>
+          </a:xfrm>
+          <a:prstGeom prst="rect">
+            <a:avLst/>
+          </a:prstGeom>
+        </p:spPr>
+      </p:pic>
     </p:spTree>
     <p:extLst>
       <p:ext uri="{BB962C8B-B14F-4D97-AF65-F5344CB8AC3E}">
-        <p14:creationId xmlns:p14="http://schemas.microsoft.com/office/powerpoint/2010/main" val="664319188"/>
+        <p14:creationId xmlns:p14="http://schemas.microsoft.com/office/powerpoint/2010/main" val="967945834"/>
       </p:ext>
     </p:extLst>
   </p:cSld>
@@ -5218,7 +6083,31 @@
           <a:p>
             <a:r>
               <a:rPr lang="en-GB" dirty="0"/>
-              <a:t>A short explanation of the </a:t>
+              <a:t>A </a:t>
+            </a:r>
+            <a:r>
+              <a:rPr lang="hr-HR" dirty="0"/>
+              <a:t>S</a:t>
+            </a:r>
+            <a:r>
+              <a:rPr lang="en-GB" dirty="0" err="1"/>
+              <a:t>hort</a:t>
+            </a:r>
+            <a:r>
+              <a:rPr lang="en-GB" dirty="0"/>
+              <a:t> </a:t>
+            </a:r>
+            <a:r>
+              <a:rPr lang="hr-HR" dirty="0"/>
+              <a:t>E</a:t>
+            </a:r>
+            <a:r>
+              <a:rPr lang="en-GB" dirty="0" err="1"/>
+              <a:t>xplanation</a:t>
+            </a:r>
+            <a:r>
+              <a:rPr lang="en-GB" dirty="0"/>
+              <a:t> of the </a:t>
             </a:r>
             <a:r>
               <a:rPr lang="hr-HR" dirty="0" err="1"/>
@@ -5226,8 +6115,17 @@
             </a:r>
             <a:r>
               <a:rPr lang="en-GB" dirty="0"/>
-              <a:t> analysis</a:t>
-            </a:r>
+              <a:t> </a:t>
+            </a:r>
+            <a:r>
+              <a:rPr lang="hr-HR" dirty="0"/>
+              <a:t>A</a:t>
+            </a:r>
+            <a:r>
+              <a:rPr lang="en-GB" dirty="0" err="1"/>
+              <a:t>nalysis</a:t>
+            </a:r>
+            <a:endParaRPr lang="en-GB" dirty="0"/>
           </a:p>
         </p:txBody>
       </p:sp>
@@ -5288,7 +6186,15 @@
             </a:r>
             <a:r>
               <a:rPr lang="en-GB" b="1" dirty="0"/>
-              <a:t> analysis</a:t>
+              <a:t> </a:t>
+            </a:r>
+            <a:r>
+              <a:rPr lang="hr-HR" b="1" dirty="0"/>
+              <a:t>A</a:t>
+            </a:r>
+            <a:r>
+              <a:rPr lang="en-GB" b="1" dirty="0" err="1"/>
+              <a:t>nalysis</a:t>
             </a:r>
             <a:endParaRPr lang="hr-HR" b="1" dirty="0"/>
           </a:p>
@@ -5324,14 +6230,6 @@
             <a:r>
               <a:rPr lang="en-GB" b="1" dirty="0"/>
               <a:t>a few alternatives</a:t>
-            </a:r>
-            <a:r>
-              <a:rPr lang="en-GB" dirty="0"/>
-              <a:t> – a good simulation of </a:t>
-            </a:r>
-            <a:r>
-              <a:rPr lang="en-GB" b="1" dirty="0"/>
-              <a:t>the buying process</a:t>
             </a:r>
           </a:p>
         </p:txBody>
@@ -5364,7 +6262,7 @@
         </p:blipFill>
         <p:spPr>
           <a:xfrm>
-            <a:off x="1115616" y="3833567"/>
+            <a:off x="1205880" y="3430014"/>
             <a:ext cx="6732240" cy="2427940"/>
           </a:xfrm>
           <a:prstGeom prst="rect">
@@ -5429,13 +6327,22 @@
             </a:r>
             <a:r>
               <a:rPr lang="en-GB" b="1" dirty="0"/>
-              <a:t> analysis</a:t>
-            </a:r>
-          </a:p>
-        </p:txBody>
-      </p:sp>
-      <mc:AlternateContent xmlns:mc="http://schemas.openxmlformats.org/markup-compatibility/2006">
-        <mc:Choice xmlns:a14="http://schemas.microsoft.com/office/drawing/2010/main" Requires="a14">
+              <a:t> </a:t>
+            </a:r>
+            <a:r>
+              <a:rPr lang="hr-HR" b="1" dirty="0"/>
+              <a:t>A</a:t>
+            </a:r>
+            <a:r>
+              <a:rPr lang="en-GB" b="1" dirty="0" err="1"/>
+              <a:t>nalysis</a:t>
+            </a:r>
+            <a:endParaRPr lang="en-GB" b="1" dirty="0"/>
+          </a:p>
+        </p:txBody>
+      </p:sp>
+      <mc:AlternateContent xmlns:mc="http://schemas.openxmlformats.org/markup-compatibility/2006" xmlns:a14="http://schemas.microsoft.com/office/drawing/2010/main">
+        <mc:Choice Requires="a14">
           <p:sp>
             <p:nvSpPr>
               <p:cNvPr id="6" name="Rezervirano mjesto sadržaja 5">
@@ -5455,7 +6362,7 @@
             <p:spPr/>
             <p:txBody>
               <a:bodyPr>
-                <a:normAutofit lnSpcReduction="10000"/>
+                <a:normAutofit/>
               </a:bodyPr>
               <a:lstStyle/>
               <a:p>
@@ -5469,17 +6376,25 @@
                 </a:r>
                 <a:r>
                   <a:rPr lang="en-GB" b="1" dirty="0"/>
-                  <a:t>the values (coefficients) of the products </a:t>
+                  <a:t>the values </a:t>
                 </a:r>
                 <a:r>
                   <a:rPr lang="en-GB" dirty="0"/>
-                  <a:t>that are used to calculate their utilities</a:t>
+                  <a:t>(utilities)</a:t>
+                </a:r>
+                <a:r>
+                  <a:rPr lang="en-GB" b="1" dirty="0"/>
+                  <a:t> of the products</a:t>
+                </a:r>
+                <a:r>
+                  <a:rPr lang="en-GB" dirty="0"/>
+                  <a:t> from the given choices</a:t>
                 </a:r>
               </a:p>
               <a:p>
                 <a:r>
                   <a:rPr lang="en-GB" dirty="0"/>
-                  <a:t>With products’ utilities, multinomial logit model gives us the probability that a product will be chosen as best/worst from a group of products:</a:t>
+                  <a:t>With products’ utilities, multinomial logit model gives us the probability that a product will be chosen from a group of products:</a:t>
                 </a:r>
               </a:p>
               <a:p>
@@ -5702,7 +6617,7 @@
             </p:txBody>
           </p:sp>
         </mc:Choice>
-        <mc:Fallback>
+        <mc:Fallback xmlns="">
           <p:sp>
             <p:nvSpPr>
               <p:cNvPr id="6" name="Rezervirano mjesto sadržaja 5">
@@ -5723,7 +6638,7 @@
               <a:blipFill>
                 <a:blip r:embed="rId2"/>
                 <a:stretch>
-                  <a:fillRect l="-1704" t="-2830" r="-1407"/>
+                  <a:fillRect l="-1704" t="-1752"/>
                 </a:stretch>
               </a:blipFill>
             </p:spPr>
@@ -5799,55 +6714,56 @@
             </a:r>
             <a:r>
               <a:rPr lang="en-GB" b="1" dirty="0"/>
-              <a:t> analysis</a:t>
-            </a:r>
-          </a:p>
-        </p:txBody>
-      </p:sp>
-      <p:sp>
-        <p:nvSpPr>
-          <p:cNvPr id="6" name="Rezervirano mjesto sadržaja 5">
+              <a:t> </a:t>
+            </a:r>
+            <a:r>
+              <a:rPr lang="hr-HR" b="1" dirty="0"/>
+              <a:t>A</a:t>
+            </a:r>
+            <a:r>
+              <a:rPr lang="en-GB" b="1" dirty="0" err="1"/>
+              <a:t>nalysis</a:t>
+            </a:r>
+            <a:endParaRPr lang="en-GB" b="1" dirty="0"/>
+          </a:p>
+        </p:txBody>
+      </p:sp>
+      <p:pic>
+        <p:nvPicPr>
+          <p:cNvPr id="7" name="Slika 6">
             <a:extLst>
               <a:ext uri="{FF2B5EF4-FFF2-40B4-BE49-F238E27FC236}">
-                <a16:creationId xmlns:a16="http://schemas.microsoft.com/office/drawing/2014/main" id="{086DAD2F-4774-4F7D-B820-2FD9E41F13D4}"/>
+                <a16:creationId xmlns:a16="http://schemas.microsoft.com/office/drawing/2014/main" id="{BA1D5EE0-C8FC-442B-9165-BC11631D6CF7}"/>
               </a:ext>
             </a:extLst>
           </p:cNvPr>
-          <p:cNvSpPr>
-            <a:spLocks noGrp="1"/>
-          </p:cNvSpPr>
-          <p:nvPr>
-            <p:ph idx="1"/>
-          </p:nvPr>
-        </p:nvSpPr>
-        <p:spPr/>
-        <p:txBody>
-          <a:bodyPr>
-            <a:normAutofit/>
-          </a:bodyPr>
-          <a:lstStyle/>
-          <a:p>
-            <a:r>
-              <a:rPr lang="en-GB" dirty="0"/>
-              <a:t>A simpler version of the CBC (Choice Based Conjoint) analysis</a:t>
-            </a:r>
-          </a:p>
-          <a:p>
-            <a:r>
-              <a:rPr lang="en-GB" dirty="0"/>
-              <a:t>Easier for the respondents because they have </a:t>
-            </a:r>
-            <a:r>
-              <a:rPr lang="en-GB" b="1" dirty="0"/>
-              <a:t>less information </a:t>
-            </a:r>
-            <a:r>
-              <a:rPr lang="en-GB" dirty="0"/>
-              <a:t>to process (full products are shown, not their specific features)</a:t>
-            </a:r>
-          </a:p>
-        </p:txBody>
-      </p:sp>
+          <p:cNvPicPr>
+            <a:picLocks noChangeAspect="1"/>
+          </p:cNvPicPr>
+          <p:nvPr/>
+        </p:nvPicPr>
+        <p:blipFill>
+          <a:blip r:embed="rId2">
+            <a:extLst>
+              <a:ext uri="{28A0092B-C50C-407E-A947-70E740481C1C}">
+                <a14:useLocalDpi xmlns:a14="http://schemas.microsoft.com/office/drawing/2010/main" val="0"/>
+              </a:ext>
+            </a:extLst>
+          </a:blip>
+          <a:stretch>
+            <a:fillRect/>
+          </a:stretch>
+        </p:blipFill>
+        <p:spPr>
+          <a:xfrm>
+            <a:off x="786408" y="1196752"/>
+            <a:ext cx="7571184" cy="5134043"/>
+          </a:xfrm>
+          <a:prstGeom prst="rect">
+            <a:avLst/>
+          </a:prstGeom>
+        </p:spPr>
+      </p:pic>
     </p:spTree>
     <p:extLst>
       <p:ext uri="{BB962C8B-B14F-4D97-AF65-F5344CB8AC3E}">
@@ -5880,10 +6796,10 @@
       </p:grpSpPr>
       <p:sp>
         <p:nvSpPr>
-          <p:cNvPr id="4" name="Naslov 3">
+          <p:cNvPr id="3" name="Naslov 2">
             <a:extLst>
               <a:ext uri="{FF2B5EF4-FFF2-40B4-BE49-F238E27FC236}">
-                <a16:creationId xmlns:a16="http://schemas.microsoft.com/office/drawing/2014/main" id="{8336E22B-76C4-4599-9A12-9962CEED1441}"/>
+                <a16:creationId xmlns:a16="http://schemas.microsoft.com/office/drawing/2014/main" id="{2CABC428-AD66-468E-976E-4D8517731473}"/>
               </a:ext>
             </a:extLst>
           </p:cNvPr>
@@ -5900,18 +6816,31 @@
           <a:lstStyle/>
           <a:p>
             <a:r>
-              <a:rPr lang="en-GB" dirty="0"/>
-              <a:t>steps</a:t>
-            </a:r>
-          </a:p>
-        </p:txBody>
-      </p:sp>
-      <p:sp>
-        <p:nvSpPr>
-          <p:cNvPr id="5" name="Rezervirano mjesto teksta 4">
+              <a:rPr lang="hr-HR" b="1" dirty="0" err="1"/>
+              <a:t>MaxDiff</a:t>
+            </a:r>
+            <a:r>
+              <a:rPr lang="en-GB" b="1" dirty="0"/>
+              <a:t> </a:t>
+            </a:r>
+            <a:r>
+              <a:rPr lang="hr-HR" b="1" dirty="0"/>
+              <a:t>A</a:t>
+            </a:r>
+            <a:r>
+              <a:rPr lang="en-GB" b="1" dirty="0" err="1"/>
+              <a:t>nalysis</a:t>
+            </a:r>
+            <a:endParaRPr lang="en-GB" b="1" dirty="0"/>
+          </a:p>
+        </p:txBody>
+      </p:sp>
+      <p:sp>
+        <p:nvSpPr>
+          <p:cNvPr id="6" name="Rezervirano mjesto sadržaja 5">
             <a:extLst>
               <a:ext uri="{FF2B5EF4-FFF2-40B4-BE49-F238E27FC236}">
-                <a16:creationId xmlns:a16="http://schemas.microsoft.com/office/drawing/2014/main" id="{16579881-AFAA-4AE5-8C91-EE31693372E0}"/>
+                <a16:creationId xmlns:a16="http://schemas.microsoft.com/office/drawing/2014/main" id="{086DAD2F-4774-4F7D-B820-2FD9E41F13D4}"/>
               </a:ext>
             </a:extLst>
           </p:cNvPr>
@@ -5919,25 +6848,31 @@
             <a:spLocks noGrp="1"/>
           </p:cNvSpPr>
           <p:nvPr>
-            <p:ph type="body" idx="1"/>
-          </p:nvPr>
-        </p:nvSpPr>
-        <p:spPr/>
-        <p:txBody>
-          <a:bodyPr/>
-          <a:lstStyle/>
-          <a:p>
-            <a:r>
-              <a:rPr lang="en-GB" dirty="0"/>
-              <a:t>Description of steps in a </a:t>
-            </a:r>
-            <a:r>
-              <a:rPr lang="hr-HR" dirty="0" err="1"/>
-              <a:t>MaxDiff</a:t>
-            </a:r>
-            <a:r>
-              <a:rPr lang="en-GB" dirty="0"/>
-              <a:t> project implementation</a:t>
+            <p:ph idx="1"/>
+          </p:nvPr>
+        </p:nvSpPr>
+        <p:spPr/>
+        <p:txBody>
+          <a:bodyPr>
+            <a:normAutofit/>
+          </a:bodyPr>
+          <a:lstStyle/>
+          <a:p>
+            <a:r>
+              <a:rPr lang="en-GB" dirty="0"/>
+              <a:t>The best product (from a group) is the one with the highest probability of being chosen</a:t>
+            </a:r>
+          </a:p>
+          <a:p>
+            <a:r>
+              <a:rPr lang="en-GB" dirty="0"/>
+              <a:t>The worst product (from a group) is the one with the least probability of being chosen</a:t>
+            </a:r>
+          </a:p>
+          <a:p>
+            <a:r>
+              <a:rPr lang="en-GB" dirty="0"/>
+              <a:t>A simpler version of the CBC (Choice Based Conjoint) analysis</a:t>
             </a:r>
           </a:p>
         </p:txBody>
@@ -5945,7 +6880,7 @@
     </p:spTree>
     <p:extLst>
       <p:ext uri="{BB962C8B-B14F-4D97-AF65-F5344CB8AC3E}">
-        <p14:creationId xmlns:p14="http://schemas.microsoft.com/office/powerpoint/2010/main" val="3315692912"/>
+        <p14:creationId xmlns:p14="http://schemas.microsoft.com/office/powerpoint/2010/main" val="1847137277"/>
       </p:ext>
     </p:extLst>
   </p:cSld>

</xml_diff>